<commit_message>
endret "regneklynge" -> "dataklynge"
</commit_message>
<xml_diff>
--- a/Oblig 1/Datastruktur.pptx
+++ b/Oblig 1/Datastruktur.pptx
@@ -5,11 +5,10 @@
     <p:sldMasterId id="2147483648" r:id="rId1"/>
   </p:sldMasterIdLst>
   <p:notesMasterIdLst>
-    <p:notesMasterId r:id="rId4"/>
+    <p:notesMasterId r:id="rId3"/>
   </p:notesMasterIdLst>
   <p:sldIdLst>
     <p:sldId id="256" r:id="rId2"/>
-    <p:sldId id="258" r:id="rId3"/>
   </p:sldIdLst>
   <p:sldSz cx="12192000" cy="6858000"/>
   <p:notesSz cx="6858000" cy="9144000"/>
@@ -123,6 +122,9 @@
         </p15:guide>
       </p15:sldGuideLst>
     </p:ext>
+    <p:ext uri="{2D200454-40CA-4A62-9FC3-DE9A4176ACB9}">
+      <p15:notesGuideLst xmlns:p15="http://schemas.microsoft.com/office/powerpoint/2012/main"/>
+    </p:ext>
   </p:extLst>
 </p:presentation>
 </file>
@@ -209,7 +211,7 @@
           <a:p>
             <a:fld id="{C407C5E1-F4A4-470A-BAB7-E3D58E2EB29B}" type="datetimeFigureOut">
               <a:rPr lang="nb-NO" smtClean="0"/>
-              <a:t>20.01.2020</a:t>
+              <a:t>22.01.2020</a:t>
             </a:fld>
             <a:endParaRPr lang="nb-NO"/>
           </a:p>
@@ -477,90 +479,6 @@
 </p:notesMaster>
 </file>
 
-<file path=ppt/notesSlides/notesSlide1.xml><?xml version="1.0" encoding="utf-8"?>
-<p:notes xmlns:a="http://schemas.openxmlformats.org/drawingml/2006/main" xmlns:r="http://schemas.openxmlformats.org/officeDocument/2006/relationships" xmlns:p="http://schemas.openxmlformats.org/presentationml/2006/main">
-  <p:cSld>
-    <p:spTree>
-      <p:nvGrpSpPr>
-        <p:cNvPr id="1" name=""/>
-        <p:cNvGrpSpPr/>
-        <p:nvPr/>
-      </p:nvGrpSpPr>
-      <p:grpSpPr>
-        <a:xfrm>
-          <a:off x="0" y="0"/>
-          <a:ext cx="0" cy="0"/>
-          <a:chOff x="0" y="0"/>
-          <a:chExt cx="0" cy="0"/>
-        </a:xfrm>
-      </p:grpSpPr>
-      <p:sp>
-        <p:nvSpPr>
-          <p:cNvPr id="2" name="Plassholder for lysbilde 1"/>
-          <p:cNvSpPr>
-            <a:spLocks noGrp="1" noRot="1" noChangeAspect="1"/>
-          </p:cNvSpPr>
-          <p:nvPr>
-            <p:ph type="sldImg"/>
-          </p:nvPr>
-        </p:nvSpPr>
-        <p:spPr/>
-      </p:sp>
-      <p:sp>
-        <p:nvSpPr>
-          <p:cNvPr id="3" name="Plassholder for notater 2"/>
-          <p:cNvSpPr>
-            <a:spLocks noGrp="1"/>
-          </p:cNvSpPr>
-          <p:nvPr>
-            <p:ph type="body" idx="1"/>
-          </p:nvPr>
-        </p:nvSpPr>
-        <p:spPr/>
-        <p:txBody>
-          <a:bodyPr/>
-          <a:lstStyle/>
-          <a:p>
-            <a:endParaRPr lang="nb-NO"/>
-          </a:p>
-        </p:txBody>
-      </p:sp>
-      <p:sp>
-        <p:nvSpPr>
-          <p:cNvPr id="4" name="Plassholder for lysbildenummer 3"/>
-          <p:cNvSpPr>
-            <a:spLocks noGrp="1"/>
-          </p:cNvSpPr>
-          <p:nvPr>
-            <p:ph type="sldNum" sz="quarter" idx="10"/>
-          </p:nvPr>
-        </p:nvSpPr>
-        <p:spPr/>
-        <p:txBody>
-          <a:bodyPr/>
-          <a:lstStyle/>
-          <a:p>
-            <a:fld id="{D2C2958E-25EA-42CE-87AF-3705073F2127}" type="slidenum">
-              <a:rPr lang="nb-NO" smtClean="0"/>
-              <a:t>2</a:t>
-            </a:fld>
-            <a:endParaRPr lang="nb-NO"/>
-          </a:p>
-        </p:txBody>
-      </p:sp>
-    </p:spTree>
-    <p:extLst>
-      <p:ext uri="{BB962C8B-B14F-4D97-AF65-F5344CB8AC3E}">
-        <p14:creationId xmlns:p14="http://schemas.microsoft.com/office/powerpoint/2010/main" val="3285750555"/>
-      </p:ext>
-    </p:extLst>
-  </p:cSld>
-  <p:clrMapOvr>
-    <a:masterClrMapping/>
-  </p:clrMapOvr>
-</p:notes>
-</file>
-
 <file path=ppt/slideLayouts/slideLayout1.xml><?xml version="1.0" encoding="utf-8"?>
 <p:sldLayout xmlns:a="http://schemas.openxmlformats.org/drawingml/2006/main" xmlns:r="http://schemas.openxmlformats.org/officeDocument/2006/relationships" xmlns:p="http://schemas.openxmlformats.org/presentationml/2006/main" type="title" preserve="1">
   <p:cSld name="Tittellysbilde">
@@ -692,7 +610,7 @@
           <a:p>
             <a:fld id="{083A9BE8-26B7-4D1D-8CFD-17723E99B246}" type="datetimeFigureOut">
               <a:rPr lang="nb-NO" smtClean="0"/>
-              <a:t>20.01.2020</a:t>
+              <a:t>22.01.2020</a:t>
             </a:fld>
             <a:endParaRPr lang="nb-NO"/>
           </a:p>
@@ -862,7 +780,7 @@
           <a:p>
             <a:fld id="{083A9BE8-26B7-4D1D-8CFD-17723E99B246}" type="datetimeFigureOut">
               <a:rPr lang="nb-NO" smtClean="0"/>
-              <a:t>20.01.2020</a:t>
+              <a:t>22.01.2020</a:t>
             </a:fld>
             <a:endParaRPr lang="nb-NO"/>
           </a:p>
@@ -1042,7 +960,7 @@
           <a:p>
             <a:fld id="{083A9BE8-26B7-4D1D-8CFD-17723E99B246}" type="datetimeFigureOut">
               <a:rPr lang="nb-NO" smtClean="0"/>
-              <a:t>20.01.2020</a:t>
+              <a:t>22.01.2020</a:t>
             </a:fld>
             <a:endParaRPr lang="nb-NO"/>
           </a:p>
@@ -1212,7 +1130,7 @@
           <a:p>
             <a:fld id="{083A9BE8-26B7-4D1D-8CFD-17723E99B246}" type="datetimeFigureOut">
               <a:rPr lang="nb-NO" smtClean="0"/>
-              <a:t>20.01.2020</a:t>
+              <a:t>22.01.2020</a:t>
             </a:fld>
             <a:endParaRPr lang="nb-NO"/>
           </a:p>
@@ -1458,7 +1376,7 @@
           <a:p>
             <a:fld id="{083A9BE8-26B7-4D1D-8CFD-17723E99B246}" type="datetimeFigureOut">
               <a:rPr lang="nb-NO" smtClean="0"/>
-              <a:t>20.01.2020</a:t>
+              <a:t>22.01.2020</a:t>
             </a:fld>
             <a:endParaRPr lang="nb-NO"/>
           </a:p>
@@ -1690,7 +1608,7 @@
           <a:p>
             <a:fld id="{083A9BE8-26B7-4D1D-8CFD-17723E99B246}" type="datetimeFigureOut">
               <a:rPr lang="nb-NO" smtClean="0"/>
-              <a:t>20.01.2020</a:t>
+              <a:t>22.01.2020</a:t>
             </a:fld>
             <a:endParaRPr lang="nb-NO"/>
           </a:p>
@@ -2057,7 +1975,7 @@
           <a:p>
             <a:fld id="{083A9BE8-26B7-4D1D-8CFD-17723E99B246}" type="datetimeFigureOut">
               <a:rPr lang="nb-NO" smtClean="0"/>
-              <a:t>20.01.2020</a:t>
+              <a:t>22.01.2020</a:t>
             </a:fld>
             <a:endParaRPr lang="nb-NO"/>
           </a:p>
@@ -2175,7 +2093,7 @@
           <a:p>
             <a:fld id="{083A9BE8-26B7-4D1D-8CFD-17723E99B246}" type="datetimeFigureOut">
               <a:rPr lang="nb-NO" smtClean="0"/>
-              <a:t>20.01.2020</a:t>
+              <a:t>22.01.2020</a:t>
             </a:fld>
             <a:endParaRPr lang="nb-NO"/>
           </a:p>
@@ -2270,7 +2188,7 @@
           <a:p>
             <a:fld id="{083A9BE8-26B7-4D1D-8CFD-17723E99B246}" type="datetimeFigureOut">
               <a:rPr lang="nb-NO" smtClean="0"/>
-              <a:t>20.01.2020</a:t>
+              <a:t>22.01.2020</a:t>
             </a:fld>
             <a:endParaRPr lang="nb-NO"/>
           </a:p>
@@ -2547,7 +2465,7 @@
           <a:p>
             <a:fld id="{083A9BE8-26B7-4D1D-8CFD-17723E99B246}" type="datetimeFigureOut">
               <a:rPr lang="nb-NO" smtClean="0"/>
-              <a:t>20.01.2020</a:t>
+              <a:t>22.01.2020</a:t>
             </a:fld>
             <a:endParaRPr lang="nb-NO"/>
           </a:p>
@@ -2800,7 +2718,7 @@
           <a:p>
             <a:fld id="{083A9BE8-26B7-4D1D-8CFD-17723E99B246}" type="datetimeFigureOut">
               <a:rPr lang="nb-NO" smtClean="0"/>
-              <a:t>20.01.2020</a:t>
+              <a:t>22.01.2020</a:t>
             </a:fld>
             <a:endParaRPr lang="nb-NO"/>
           </a:p>
@@ -3013,7 +2931,7 @@
           <a:p>
             <a:fld id="{083A9BE8-26B7-4D1D-8CFD-17723E99B246}" type="datetimeFigureOut">
               <a:rPr lang="nb-NO" smtClean="0"/>
-              <a:t>20.01.2020</a:t>
+              <a:t>22.01.2020</a:t>
             </a:fld>
             <a:endParaRPr lang="nb-NO"/>
           </a:p>
@@ -3486,7 +3404,7 @@
           <p:spPr>
             <a:xfrm>
               <a:off x="1094015" y="546999"/>
-              <a:ext cx="2906486" cy="330073"/>
+              <a:ext cx="2906486" cy="459259"/>
             </a:xfrm>
             <a:prstGeom prst="rect">
               <a:avLst/>
@@ -3663,8 +3581,16 @@
             <a:lstStyle/>
             <a:p>
               <a:r>
+                <a:rPr lang="en-US" sz="1000" dirty="0" err="1"/>
+                <a:t>D</a:t>
+              </a:r>
+              <a:r>
                 <a:rPr lang="en-US" sz="1000" dirty="0" err="1" smtClean="0"/>
-                <a:t>Regneklynge</a:t>
+                <a:t>ata</a:t>
+              </a:r>
+              <a:r>
+                <a:rPr lang="en-US" sz="1000" dirty="0" err="1" smtClean="0"/>
+                <a:t>klynge</a:t>
               </a:r>
               <a:endParaRPr lang="nb-NO" sz="1000" dirty="0"/>
             </a:p>
@@ -3880,8 +3806,16 @@
               </a:p>
               <a:p>
                 <a:r>
+                  <a:rPr lang="en-US" sz="800" dirty="0" err="1"/>
+                  <a:t>D</a:t>
+                </a:r>
+                <a:r>
                   <a:rPr lang="en-US" sz="800" dirty="0" err="1" smtClean="0"/>
-                  <a:t>Regneklynge</a:t>
+                  <a:t>ata</a:t>
+                </a:r>
+                <a:r>
+                  <a:rPr lang="en-US" sz="800" dirty="0" err="1" smtClean="0"/>
+                  <a:t>klynge</a:t>
                 </a:r>
                 <a:r>
                   <a:rPr lang="en-US" sz="800" dirty="0" smtClean="0"/>
@@ -3897,7 +3831,7 @@
                 </a:r>
                 <a:r>
                   <a:rPr lang="en-US" sz="800" dirty="0" err="1" smtClean="0"/>
-                  <a:t>Regneklynge</a:t>
+                  <a:t>Dataklynge</a:t>
                 </a:r>
                 <a:r>
                   <a:rPr lang="en-US" sz="800" dirty="0" smtClean="0"/>
@@ -3914,22 +3848,21 @@
                 </a:r>
                 <a:r>
                   <a:rPr lang="en-US" sz="800" dirty="0" smtClean="0"/>
-                  <a:t>( new Node(16, 1));</a:t>
+                  <a:t>( new </a:t>
                 </a:r>
-              </a:p>
-              <a:p>
                 <a:r>
-                  <a:rPr lang="en-US" sz="800" dirty="0" err="1"/>
-                  <a:t>abel.leggTilNode</a:t>
+                  <a:rPr lang="en-US" sz="800" dirty="0" smtClean="0"/>
+                  <a:t>Node(128, </a:t>
                 </a:r>
                 <a:r>
                   <a:rPr lang="en-US" sz="800" dirty="0"/>
-                  <a:t>( new Node(16, 1</a:t>
+                  <a:t>2</a:t>
                 </a:r>
                 <a:r>
                   <a:rPr lang="en-US" sz="800" dirty="0" smtClean="0"/>
                   <a:t>));</a:t>
                 </a:r>
+                <a:endParaRPr lang="en-US" sz="800" dirty="0" smtClean="0"/>
               </a:p>
               <a:p>
                 <a:r>
@@ -3943,6 +3876,29 @@
                 <a:r>
                   <a:rPr lang="en-US" sz="800" dirty="0" smtClean="0"/>
                   <a:t>Node(128, 2));</a:t>
+                </a:r>
+                <a:endParaRPr lang="en-US" sz="800" dirty="0" smtClean="0"/>
+              </a:p>
+              <a:p>
+                <a:r>
+                  <a:rPr lang="en-US" sz="800" dirty="0" err="1"/>
+                  <a:t>abel.leggTilNode</a:t>
+                </a:r>
+                <a:r>
+                  <a:rPr lang="en-US" sz="800" dirty="0"/>
+                  <a:t>( new </a:t>
+                </a:r>
+                <a:r>
+                  <a:rPr lang="en-US" sz="800" dirty="0" smtClean="0"/>
+                  <a:t>Node(16, </a:t>
+                </a:r>
+                <a:r>
+                  <a:rPr lang="en-US" sz="800" dirty="0"/>
+                  <a:t>1</a:t>
+                </a:r>
+                <a:r>
+                  <a:rPr lang="en-US" sz="800" dirty="0" smtClean="0"/>
+                  <a:t>));</a:t>
                 </a:r>
                 <a:endParaRPr lang="en-US" sz="800" dirty="0" smtClean="0"/>
               </a:p>
@@ -4653,7 +4609,7 @@
               <a:pPr algn="ctr"/>
               <a:r>
                 <a:rPr lang="en-US" sz="800" dirty="0" smtClean="0"/>
-                <a:t>16</a:t>
+                <a:t>128</a:t>
               </a:r>
               <a:endParaRPr lang="nb-NO" sz="800" dirty="0"/>
             </a:p>
@@ -4721,11 +4677,7 @@
             <a:p>
               <a:r>
                 <a:rPr lang="en-US" sz="800" dirty="0" smtClean="0"/>
-                <a:t>type</a:t>
-              </a:r>
-              <a:r>
-                <a:rPr lang="en-US" sz="800" dirty="0" smtClean="0"/>
-                <a:t>: </a:t>
+                <a:t>type: </a:t>
               </a:r>
               <a:r>
                 <a:rPr lang="en-US" sz="800" dirty="0" err="1" smtClean="0"/>
@@ -4790,8 +4742,8 @@
             <a:p>
               <a:pPr algn="ctr"/>
               <a:r>
-                <a:rPr lang="en-US" sz="800" dirty="0" smtClean="0"/>
-                <a:t>1</a:t>
+                <a:rPr lang="en-US" sz="800" dirty="0"/>
+                <a:t>2</a:t>
               </a:r>
               <a:endParaRPr lang="nb-NO" sz="800" dirty="0"/>
             </a:p>
@@ -4859,11 +4811,7 @@
             <a:p>
               <a:r>
                 <a:rPr lang="en-US" sz="800" dirty="0" smtClean="0"/>
-                <a:t>type</a:t>
-              </a:r>
-              <a:r>
-                <a:rPr lang="en-US" sz="800" dirty="0" smtClean="0"/>
-                <a:t>: </a:t>
+                <a:t>type: </a:t>
               </a:r>
               <a:r>
                 <a:rPr lang="en-US" sz="800" dirty="0" err="1" smtClean="0"/>
@@ -5063,11 +5011,7 @@
                 </a:r>
                 <a:r>
                   <a:rPr lang="en-US" sz="800" dirty="0" err="1" smtClean="0"/>
-                  <a:t>p</a:t>
-                </a:r>
-                <a:r>
-                  <a:rPr lang="en-US" sz="800" dirty="0" err="1" smtClean="0"/>
-                  <a:t>rosessorAntall</a:t>
+                  <a:t>prosessorAntall</a:t>
                 </a:r>
                 <a:endParaRPr lang="en-US" sz="800" dirty="0" smtClean="0"/>
               </a:p>
@@ -5300,7 +5244,7 @@
               <a:pPr algn="ctr"/>
               <a:r>
                 <a:rPr lang="en-US" sz="800" dirty="0" smtClean="0"/>
-                <a:t>16</a:t>
+                <a:t>128</a:t>
               </a:r>
               <a:endParaRPr lang="nb-NO" sz="800" dirty="0"/>
             </a:p>
@@ -5368,11 +5312,7 @@
             <a:p>
               <a:r>
                 <a:rPr lang="en-US" sz="800" dirty="0" smtClean="0"/>
-                <a:t>type</a:t>
-              </a:r>
-              <a:r>
-                <a:rPr lang="en-US" sz="800" dirty="0" smtClean="0"/>
-                <a:t>: </a:t>
+                <a:t>type: </a:t>
               </a:r>
               <a:r>
                 <a:rPr lang="en-US" sz="800" dirty="0" err="1" smtClean="0"/>
@@ -5437,8 +5377,8 @@
             <a:p>
               <a:pPr algn="ctr"/>
               <a:r>
-                <a:rPr lang="en-US" sz="800" dirty="0" smtClean="0"/>
-                <a:t>1</a:t>
+                <a:rPr lang="en-US" sz="800" dirty="0"/>
+                <a:t>2</a:t>
               </a:r>
               <a:endParaRPr lang="nb-NO" sz="800" dirty="0"/>
             </a:p>
@@ -5506,11 +5446,7 @@
             <a:p>
               <a:r>
                 <a:rPr lang="en-US" sz="800" dirty="0" smtClean="0"/>
-                <a:t>type</a:t>
-              </a:r>
-              <a:r>
-                <a:rPr lang="en-US" sz="800" dirty="0" smtClean="0"/>
-                <a:t>: </a:t>
+                <a:t>type: </a:t>
               </a:r>
               <a:r>
                 <a:rPr lang="en-US" sz="800" dirty="0" err="1" smtClean="0"/>
@@ -5943,7 +5879,7 @@
               <a:pPr algn="ctr"/>
               <a:r>
                 <a:rPr lang="en-US" sz="800" dirty="0" smtClean="0"/>
-                <a:t>128</a:t>
+                <a:t>16</a:t>
               </a:r>
               <a:endParaRPr lang="nb-NO" sz="800" dirty="0"/>
             </a:p>
@@ -6011,11 +5947,7 @@
             <a:p>
               <a:r>
                 <a:rPr lang="en-US" sz="800" dirty="0" smtClean="0"/>
-                <a:t>type</a:t>
-              </a:r>
-              <a:r>
-                <a:rPr lang="en-US" sz="800" dirty="0" smtClean="0"/>
-                <a:t>: </a:t>
+                <a:t>type: </a:t>
               </a:r>
               <a:r>
                 <a:rPr lang="en-US" sz="800" dirty="0" err="1" smtClean="0"/>
@@ -6080,8 +6012,8 @@
             <a:p>
               <a:pPr algn="ctr"/>
               <a:r>
-                <a:rPr lang="en-US" sz="800" dirty="0" smtClean="0"/>
-                <a:t>2</a:t>
+                <a:rPr lang="en-US" sz="800" dirty="0"/>
+                <a:t>1</a:t>
               </a:r>
               <a:endParaRPr lang="nb-NO" sz="800" dirty="0"/>
             </a:p>
@@ -6149,11 +6081,7 @@
             <a:p>
               <a:r>
                 <a:rPr lang="en-US" sz="800" dirty="0" smtClean="0"/>
-                <a:t>type</a:t>
-              </a:r>
-              <a:r>
-                <a:rPr lang="en-US" sz="800" dirty="0" smtClean="0"/>
-                <a:t>: </a:t>
+                <a:t>type: </a:t>
               </a:r>
               <a:r>
                 <a:rPr lang="en-US" sz="800" dirty="0" err="1" smtClean="0"/>
@@ -6565,15 +6493,7 @@
             <a:p>
               <a:r>
                 <a:rPr lang="en-US" sz="800" dirty="0" smtClean="0"/>
-                <a:t>type</a:t>
-              </a:r>
-              <a:r>
-                <a:rPr lang="en-US" sz="800" dirty="0" smtClean="0"/>
-                <a:t>: </a:t>
-              </a:r>
-              <a:r>
-                <a:rPr lang="en-US" sz="800" dirty="0" smtClean="0"/>
-                <a:t>String</a:t>
+                <a:t>type: String</a:t>
               </a:r>
               <a:endParaRPr lang="nb-NO" sz="800" dirty="0"/>
             </a:p>
@@ -6699,15 +6619,15 @@
             <a:p>
               <a:r>
                 <a:rPr lang="en-US" sz="800" dirty="0" smtClean="0"/>
-                <a:t>type</a:t>
-              </a:r>
-              <a:r>
-                <a:rPr lang="en-US" sz="800" dirty="0" smtClean="0"/>
-                <a:t>: </a:t>
+                <a:t>type: </a:t>
               </a:r>
               <a:r>
                 <a:rPr lang="en-US" sz="800" dirty="0" err="1" smtClean="0"/>
-                <a:t>Regneklynge</a:t>
+                <a:t>Data</a:t>
+              </a:r>
+              <a:r>
+                <a:rPr lang="en-US" sz="800" dirty="0" err="1" smtClean="0"/>
+                <a:t>klynge</a:t>
               </a:r>
               <a:endParaRPr lang="nb-NO" sz="800" dirty="0"/>
             </a:p>
@@ -6837,11 +6757,7 @@
             <a:p>
               <a:r>
                 <a:rPr lang="en-US" sz="800" dirty="0" smtClean="0"/>
-                <a:t>type</a:t>
-              </a:r>
-              <a:r>
-                <a:rPr lang="en-US" sz="800" dirty="0" smtClean="0"/>
-                <a:t>: </a:t>
+                <a:t>type: </a:t>
               </a:r>
               <a:r>
                 <a:rPr lang="en-US" sz="800" dirty="0" err="1" smtClean="0"/>
@@ -6967,11 +6883,7 @@
             <a:p>
               <a:r>
                 <a:rPr lang="en-US" sz="800" dirty="0" smtClean="0"/>
-                <a:t>type</a:t>
-              </a:r>
-              <a:r>
-                <a:rPr lang="en-US" sz="800" dirty="0" smtClean="0"/>
-                <a:t>: </a:t>
+                <a:t>type: </a:t>
               </a:r>
               <a:r>
                 <a:rPr lang="en-US" sz="800" dirty="0" err="1" smtClean="0"/>
@@ -7113,11 +7025,7 @@
             <a:p>
               <a:r>
                 <a:rPr lang="en-US" sz="800" dirty="0" smtClean="0"/>
-                <a:t>type</a:t>
-              </a:r>
-              <a:r>
-                <a:rPr lang="en-US" sz="800" dirty="0" smtClean="0"/>
-                <a:t>: </a:t>
+                <a:t>type: </a:t>
               </a:r>
               <a:r>
                 <a:rPr lang="en-US" sz="800" dirty="0" err="1" smtClean="0"/>
@@ -7677,11 +7585,7 @@
             <a:p>
               <a:r>
                 <a:rPr lang="en-US" sz="800" dirty="0" smtClean="0"/>
-                <a:t>type</a:t>
-              </a:r>
-              <a:r>
-                <a:rPr lang="en-US" sz="800" dirty="0" smtClean="0"/>
-                <a:t>: </a:t>
+                <a:t>type: </a:t>
               </a:r>
               <a:r>
                 <a:rPr lang="en-US" sz="800" dirty="0" err="1" smtClean="0"/>
@@ -8379,11 +8283,7 @@
             <a:p>
               <a:r>
                 <a:rPr lang="en-US" sz="800" dirty="0" smtClean="0"/>
-                <a:t>type</a:t>
-              </a:r>
-              <a:r>
-                <a:rPr lang="en-US" sz="800" dirty="0" smtClean="0"/>
-                <a:t>: </a:t>
+                <a:t>type: </a:t>
               </a:r>
               <a:r>
                 <a:rPr lang="en-US" sz="800" dirty="0" err="1" smtClean="0"/>
@@ -8513,11 +8413,7 @@
             <a:p>
               <a:r>
                 <a:rPr lang="en-US" sz="800" dirty="0" smtClean="0"/>
-                <a:t>type</a:t>
-              </a:r>
-              <a:r>
-                <a:rPr lang="en-US" sz="800" dirty="0" smtClean="0"/>
-                <a:t>: </a:t>
+                <a:t>type: </a:t>
               </a:r>
               <a:r>
                 <a:rPr lang="en-US" sz="800" dirty="0" err="1" smtClean="0"/>
@@ -8742,521 +8638,6 @@
     <p:extLst>
       <p:ext uri="{BB962C8B-B14F-4D97-AF65-F5344CB8AC3E}">
         <p14:creationId xmlns:p14="http://schemas.microsoft.com/office/powerpoint/2010/main" val="4169323199"/>
-      </p:ext>
-    </p:extLst>
-  </p:cSld>
-  <p:clrMapOvr>
-    <a:masterClrMapping/>
-  </p:clrMapOvr>
-  <p:timing>
-    <p:tnLst>
-      <p:par>
-        <p:cTn id="1" dur="indefinite" restart="never" nodeType="tmRoot"/>
-      </p:par>
-    </p:tnLst>
-  </p:timing>
-</p:sld>
-</file>
-
-<file path=ppt/slides/slide2.xml><?xml version="1.0" encoding="utf-8"?>
-<p:sld xmlns:a="http://schemas.openxmlformats.org/drawingml/2006/main" xmlns:r="http://schemas.openxmlformats.org/officeDocument/2006/relationships" xmlns:p="http://schemas.openxmlformats.org/presentationml/2006/main">
-  <p:cSld>
-    <p:spTree>
-      <p:nvGrpSpPr>
-        <p:cNvPr id="1" name=""/>
-        <p:cNvGrpSpPr/>
-        <p:nvPr/>
-      </p:nvGrpSpPr>
-      <p:grpSpPr>
-        <a:xfrm>
-          <a:off x="0" y="0"/>
-          <a:ext cx="0" cy="0"/>
-          <a:chOff x="0" y="0"/>
-          <a:chExt cx="0" cy="0"/>
-        </a:xfrm>
-      </p:grpSpPr>
-      <p:grpSp>
-        <p:nvGrpSpPr>
-          <p:cNvPr id="4" name="Gruppe 3"/>
-          <p:cNvGrpSpPr/>
-          <p:nvPr/>
-        </p:nvGrpSpPr>
-        <p:grpSpPr>
-          <a:xfrm>
-            <a:off x="1094014" y="628390"/>
-            <a:ext cx="4465865" cy="2261767"/>
-            <a:chOff x="1094014" y="628390"/>
-            <a:chExt cx="4465865" cy="2261767"/>
-          </a:xfrm>
-        </p:grpSpPr>
-        <p:sp>
-          <p:nvSpPr>
-            <p:cNvPr id="5" name="Avrundet rektangel 4"/>
-            <p:cNvSpPr/>
-            <p:nvPr/>
-          </p:nvSpPr>
-          <p:spPr>
-            <a:xfrm>
-              <a:off x="1094014" y="938893"/>
-              <a:ext cx="4465865" cy="1951264"/>
-            </a:xfrm>
-            <a:prstGeom prst="roundRect">
-              <a:avLst/>
-            </a:prstGeom>
-            <a:ln>
-              <a:solidFill>
-                <a:schemeClr val="accent1"/>
-              </a:solidFill>
-              <a:prstDash val="sysDash"/>
-            </a:ln>
-          </p:spPr>
-          <p:style>
-            <a:lnRef idx="2">
-              <a:schemeClr val="accent1"/>
-            </a:lnRef>
-            <a:fillRef idx="1">
-              <a:schemeClr val="lt1"/>
-            </a:fillRef>
-            <a:effectRef idx="0">
-              <a:schemeClr val="accent1"/>
-            </a:effectRef>
-            <a:fontRef idx="minor">
-              <a:schemeClr val="dk1"/>
-            </a:fontRef>
-          </p:style>
-          <p:txBody>
-            <a:bodyPr rtlCol="0" anchor="t"/>
-            <a:lstStyle/>
-            <a:p>
-              <a:endParaRPr lang="en-US" sz="1200" dirty="0"/>
-            </a:p>
-          </p:txBody>
-        </p:sp>
-        <p:sp>
-          <p:nvSpPr>
-            <p:cNvPr id="6" name="TekstSylinder 5"/>
-            <p:cNvSpPr txBox="1"/>
-            <p:nvPr/>
-          </p:nvSpPr>
-          <p:spPr>
-            <a:xfrm>
-              <a:off x="1094014" y="628390"/>
-              <a:ext cx="4408715" cy="307777"/>
-            </a:xfrm>
-            <a:prstGeom prst="rect">
-              <a:avLst/>
-            </a:prstGeom>
-            <a:noFill/>
-          </p:spPr>
-          <p:txBody>
-            <a:bodyPr wrap="square" rtlCol="0">
-              <a:spAutoFit/>
-            </a:bodyPr>
-            <a:lstStyle/>
-            <a:p>
-              <a:r>
-                <a:rPr lang="en-US" sz="1400" dirty="0" err="1" smtClean="0"/>
-                <a:t>Klassedatastruktur</a:t>
-              </a:r>
-              <a:endParaRPr lang="nb-NO" sz="1400" dirty="0"/>
-            </a:p>
-          </p:txBody>
-        </p:sp>
-      </p:grpSp>
-      <p:grpSp>
-        <p:nvGrpSpPr>
-          <p:cNvPr id="7" name="Gruppe 6"/>
-          <p:cNvGrpSpPr/>
-          <p:nvPr/>
-        </p:nvGrpSpPr>
-        <p:grpSpPr>
-          <a:xfrm>
-            <a:off x="1036864" y="3167482"/>
-            <a:ext cx="4465865" cy="2261768"/>
-            <a:chOff x="6414406" y="628389"/>
-            <a:chExt cx="4465865" cy="2261768"/>
-          </a:xfrm>
-        </p:grpSpPr>
-        <p:sp>
-          <p:nvSpPr>
-            <p:cNvPr id="8" name="Avrundet rektangel 7"/>
-            <p:cNvSpPr/>
-            <p:nvPr/>
-          </p:nvSpPr>
-          <p:spPr>
-            <a:xfrm>
-              <a:off x="6414406" y="938893"/>
-              <a:ext cx="4465865" cy="1951264"/>
-            </a:xfrm>
-            <a:prstGeom prst="roundRect">
-              <a:avLst/>
-            </a:prstGeom>
-            <a:ln>
-              <a:solidFill>
-                <a:schemeClr val="accent1"/>
-              </a:solidFill>
-              <a:prstDash val="solid"/>
-            </a:ln>
-          </p:spPr>
-          <p:style>
-            <a:lnRef idx="2">
-              <a:schemeClr val="accent1"/>
-            </a:lnRef>
-            <a:fillRef idx="1">
-              <a:schemeClr val="lt1"/>
-            </a:fillRef>
-            <a:effectRef idx="0">
-              <a:schemeClr val="accent1"/>
-            </a:effectRef>
-            <a:fontRef idx="minor">
-              <a:schemeClr val="dk1"/>
-            </a:fontRef>
-          </p:style>
-          <p:txBody>
-            <a:bodyPr rtlCol="0" anchor="ctr"/>
-            <a:lstStyle/>
-            <a:p>
-              <a:pPr algn="ctr"/>
-              <a:endParaRPr lang="nb-NO"/>
-            </a:p>
-          </p:txBody>
-        </p:sp>
-        <p:sp>
-          <p:nvSpPr>
-            <p:cNvPr id="9" name="TekstSylinder 8"/>
-            <p:cNvSpPr txBox="1"/>
-            <p:nvPr/>
-          </p:nvSpPr>
-          <p:spPr>
-            <a:xfrm>
-              <a:off x="6414406" y="628389"/>
-              <a:ext cx="4408715" cy="307777"/>
-            </a:xfrm>
-            <a:prstGeom prst="rect">
-              <a:avLst/>
-            </a:prstGeom>
-            <a:noFill/>
-          </p:spPr>
-          <p:txBody>
-            <a:bodyPr wrap="square" rtlCol="0">
-              <a:spAutoFit/>
-            </a:bodyPr>
-            <a:lstStyle/>
-            <a:p>
-              <a:r>
-                <a:rPr lang="en-US" sz="1400" dirty="0" err="1" smtClean="0"/>
-                <a:t>objekt</a:t>
-              </a:r>
-              <a:endParaRPr lang="nb-NO" sz="1400" dirty="0"/>
-            </a:p>
-          </p:txBody>
-        </p:sp>
-      </p:grpSp>
-      <p:grpSp>
-        <p:nvGrpSpPr>
-          <p:cNvPr id="13" name="Gruppe 12"/>
-          <p:cNvGrpSpPr/>
-          <p:nvPr/>
-        </p:nvGrpSpPr>
-        <p:grpSpPr>
-          <a:xfrm>
-            <a:off x="6174921" y="730566"/>
-            <a:ext cx="4460421" cy="1292663"/>
-            <a:chOff x="966107" y="987222"/>
-            <a:chExt cx="4460421" cy="1292663"/>
-          </a:xfrm>
-        </p:grpSpPr>
-        <p:grpSp>
-          <p:nvGrpSpPr>
-            <p:cNvPr id="14" name="Gruppe 13"/>
-            <p:cNvGrpSpPr/>
-            <p:nvPr/>
-          </p:nvGrpSpPr>
-          <p:grpSpPr>
-            <a:xfrm>
-              <a:off x="966107" y="1264222"/>
-              <a:ext cx="4460421" cy="1015663"/>
-              <a:chOff x="966107" y="1133598"/>
-              <a:chExt cx="4460421" cy="1015663"/>
-            </a:xfrm>
-          </p:grpSpPr>
-          <p:sp>
-            <p:nvSpPr>
-              <p:cNvPr id="16" name="TekstSylinder 15"/>
-              <p:cNvSpPr txBox="1"/>
-              <p:nvPr/>
-            </p:nvSpPr>
-            <p:spPr>
-              <a:xfrm>
-                <a:off x="1227364" y="1133598"/>
-                <a:ext cx="4199164" cy="1015663"/>
-              </a:xfrm>
-              <a:prstGeom prst="rect">
-                <a:avLst/>
-              </a:prstGeom>
-              <a:noFill/>
-              <a:ln>
-                <a:solidFill>
-                  <a:schemeClr val="accent1"/>
-                </a:solidFill>
-              </a:ln>
-            </p:spPr>
-            <p:txBody>
-              <a:bodyPr wrap="square" rtlCol="0">
-                <a:spAutoFit/>
-              </a:bodyPr>
-              <a:lstStyle/>
-              <a:p>
-                <a:endParaRPr lang="en-US" sz="1200" dirty="0"/>
-              </a:p>
-              <a:p>
-                <a:endParaRPr lang="en-US" sz="1200" dirty="0" smtClean="0"/>
-              </a:p>
-              <a:p>
-                <a:r>
-                  <a:rPr lang="nb-NO" sz="1200" dirty="0"/>
-                  <a:t>Bil3 bil = </a:t>
-                </a:r>
-                <a:r>
-                  <a:rPr lang="nb-NO" sz="1200" dirty="0" err="1"/>
-                  <a:t>new</a:t>
-                </a:r>
-                <a:r>
-                  <a:rPr lang="nb-NO" sz="1200" dirty="0"/>
-                  <a:t> Bil3("YE23456");</a:t>
-                </a:r>
-              </a:p>
-              <a:p>
-                <a:r>
-                  <a:rPr lang="nb-NO" sz="1200" dirty="0" smtClean="0"/>
-                  <a:t>Person </a:t>
-                </a:r>
-                <a:r>
-                  <a:rPr lang="nb-NO" sz="1200" dirty="0"/>
-                  <a:t>eier = </a:t>
-                </a:r>
-                <a:r>
-                  <a:rPr lang="nb-NO" sz="1200" dirty="0" err="1"/>
-                  <a:t>new</a:t>
-                </a:r>
-                <a:r>
-                  <a:rPr lang="nb-NO" sz="1200" dirty="0"/>
-                  <a:t> Person("Ola Dunk", bil);</a:t>
-                </a:r>
-              </a:p>
-              <a:p>
-                <a:r>
-                  <a:rPr lang="nb-NO" sz="1200" dirty="0" err="1" smtClean="0"/>
-                  <a:t>eier.skrivUtBilNummer</a:t>
-                </a:r>
-                <a:r>
-                  <a:rPr lang="nb-NO" sz="1200" dirty="0"/>
-                  <a:t>();</a:t>
-                </a:r>
-              </a:p>
-            </p:txBody>
-          </p:sp>
-          <p:cxnSp>
-            <p:nvCxnSpPr>
-              <p:cNvPr id="17" name="Rett linje 16"/>
-              <p:cNvCxnSpPr/>
-              <p:nvPr/>
-            </p:nvCxnSpPr>
-            <p:spPr>
-              <a:xfrm flipH="1">
-                <a:off x="966107" y="1133598"/>
-                <a:ext cx="457200" cy="0"/>
-              </a:xfrm>
-              <a:prstGeom prst="line">
-                <a:avLst/>
-              </a:prstGeom>
-              <a:ln>
-                <a:solidFill>
-                  <a:schemeClr val="accent1"/>
-                </a:solidFill>
-              </a:ln>
-            </p:spPr>
-            <p:style>
-              <a:lnRef idx="1">
-                <a:schemeClr val="accent1"/>
-              </a:lnRef>
-              <a:fillRef idx="0">
-                <a:schemeClr val="accent1"/>
-              </a:fillRef>
-              <a:effectRef idx="0">
-                <a:schemeClr val="accent1"/>
-              </a:effectRef>
-              <a:fontRef idx="minor">
-                <a:schemeClr val="tx1"/>
-              </a:fontRef>
-            </p:style>
-          </p:cxnSp>
-        </p:grpSp>
-        <p:sp>
-          <p:nvSpPr>
-            <p:cNvPr id="15" name="TekstSylinder 14"/>
-            <p:cNvSpPr txBox="1"/>
-            <p:nvPr/>
-          </p:nvSpPr>
-          <p:spPr>
-            <a:xfrm>
-              <a:off x="1227364" y="987222"/>
-              <a:ext cx="4199164" cy="276999"/>
-            </a:xfrm>
-            <a:prstGeom prst="rect">
-              <a:avLst/>
-            </a:prstGeom>
-            <a:noFill/>
-          </p:spPr>
-          <p:txBody>
-            <a:bodyPr wrap="square" rtlCol="0">
-              <a:spAutoFit/>
-            </a:bodyPr>
-            <a:lstStyle/>
-            <a:p>
-              <a:r>
-                <a:rPr lang="en-US" sz="1200" dirty="0"/>
-                <a:t>public </a:t>
-              </a:r>
-              <a:r>
-                <a:rPr lang="en-US" sz="1200" dirty="0" err="1" smtClean="0"/>
-                <a:t>metode</a:t>
-              </a:r>
-              <a:endParaRPr lang="en-US" sz="1200" dirty="0"/>
-            </a:p>
-          </p:txBody>
-        </p:sp>
-      </p:grpSp>
-      <p:grpSp>
-        <p:nvGrpSpPr>
-          <p:cNvPr id="22" name="Gruppe 21"/>
-          <p:cNvGrpSpPr/>
-          <p:nvPr/>
-        </p:nvGrpSpPr>
-        <p:grpSpPr>
-          <a:xfrm>
-            <a:off x="6988627" y="2809100"/>
-            <a:ext cx="1020537" cy="709707"/>
-            <a:chOff x="6988627" y="2809100"/>
-            <a:chExt cx="1020537" cy="709707"/>
-          </a:xfrm>
-        </p:grpSpPr>
-        <p:sp>
-          <p:nvSpPr>
-            <p:cNvPr id="18" name="Rektangel 17"/>
-            <p:cNvSpPr/>
-            <p:nvPr/>
-          </p:nvSpPr>
-          <p:spPr>
-            <a:xfrm>
-              <a:off x="6988629" y="3086099"/>
-              <a:ext cx="1020535" cy="187779"/>
-            </a:xfrm>
-            <a:prstGeom prst="rect">
-              <a:avLst/>
-            </a:prstGeom>
-            <a:ln>
-              <a:solidFill>
-                <a:schemeClr val="accent1"/>
-              </a:solidFill>
-            </a:ln>
-          </p:spPr>
-          <p:style>
-            <a:lnRef idx="2">
-              <a:schemeClr val="dk1"/>
-            </a:lnRef>
-            <a:fillRef idx="1">
-              <a:schemeClr val="lt1"/>
-            </a:fillRef>
-            <a:effectRef idx="0">
-              <a:schemeClr val="dk1"/>
-            </a:effectRef>
-            <a:fontRef idx="minor">
-              <a:schemeClr val="dk1"/>
-            </a:fontRef>
-          </p:style>
-          <p:txBody>
-            <a:bodyPr rtlCol="0" anchor="ctr"/>
-            <a:lstStyle/>
-            <a:p>
-              <a:pPr algn="ctr"/>
-              <a:endParaRPr lang="nb-NO"/>
-            </a:p>
-          </p:txBody>
-        </p:sp>
-        <p:sp>
-          <p:nvSpPr>
-            <p:cNvPr id="19" name="TekstSylinder 18"/>
-            <p:cNvSpPr txBox="1"/>
-            <p:nvPr/>
-          </p:nvSpPr>
-          <p:spPr>
-            <a:xfrm>
-              <a:off x="6988627" y="2809100"/>
-              <a:ext cx="1020535" cy="276999"/>
-            </a:xfrm>
-            <a:prstGeom prst="rect">
-              <a:avLst/>
-            </a:prstGeom>
-            <a:noFill/>
-          </p:spPr>
-          <p:txBody>
-            <a:bodyPr wrap="square" rtlCol="0">
-              <a:spAutoFit/>
-            </a:bodyPr>
-            <a:lstStyle/>
-            <a:p>
-              <a:r>
-                <a:rPr lang="en-US" sz="1200" dirty="0" err="1"/>
-                <a:t>n</a:t>
-              </a:r>
-              <a:r>
-                <a:rPr lang="en-US" sz="1200" dirty="0" err="1" smtClean="0"/>
-                <a:t>avn</a:t>
-              </a:r>
-              <a:r>
-                <a:rPr lang="en-US" sz="1200" dirty="0" smtClean="0"/>
-                <a:t>:</a:t>
-              </a:r>
-              <a:endParaRPr lang="nb-NO" dirty="0"/>
-            </a:p>
-          </p:txBody>
-        </p:sp>
-        <p:sp>
-          <p:nvSpPr>
-            <p:cNvPr id="20" name="TekstSylinder 19"/>
-            <p:cNvSpPr txBox="1"/>
-            <p:nvPr/>
-          </p:nvSpPr>
-          <p:spPr>
-            <a:xfrm>
-              <a:off x="6988628" y="3241808"/>
-              <a:ext cx="1020535" cy="276999"/>
-            </a:xfrm>
-            <a:prstGeom prst="rect">
-              <a:avLst/>
-            </a:prstGeom>
-            <a:noFill/>
-          </p:spPr>
-          <p:txBody>
-            <a:bodyPr wrap="square" rtlCol="0">
-              <a:spAutoFit/>
-            </a:bodyPr>
-            <a:lstStyle/>
-            <a:p>
-              <a:r>
-                <a:rPr lang="en-US" sz="1200" dirty="0" smtClean="0"/>
-                <a:t>type:</a:t>
-              </a:r>
-              <a:endParaRPr lang="nb-NO" dirty="0"/>
-            </a:p>
-          </p:txBody>
-        </p:sp>
-      </p:grpSp>
-    </p:spTree>
-    <p:extLst>
-      <p:ext uri="{BB962C8B-B14F-4D97-AF65-F5344CB8AC3E}">
-        <p14:creationId xmlns:p14="http://schemas.microsoft.com/office/powerpoint/2010/main" val="1239034921"/>
       </p:ext>
     </p:extLst>
   </p:cSld>

</xml_diff>

<commit_message>
metode ledigPlass i Rack oppdatert datastruktur-skisse
</commit_message>
<xml_diff>
--- a/Oblig 1/Datastruktur.pptx
+++ b/Oblig 1/Datastruktur.pptx
@@ -211,7 +211,7 @@
           <a:p>
             <a:fld id="{C407C5E1-F4A4-470A-BAB7-E3D58E2EB29B}" type="datetimeFigureOut">
               <a:rPr lang="nb-NO" smtClean="0"/>
-              <a:t>22.01.2020</a:t>
+              <a:t>23.01.2020</a:t>
             </a:fld>
             <a:endParaRPr lang="nb-NO"/>
           </a:p>
@@ -610,7 +610,7 @@
           <a:p>
             <a:fld id="{083A9BE8-26B7-4D1D-8CFD-17723E99B246}" type="datetimeFigureOut">
               <a:rPr lang="nb-NO" smtClean="0"/>
-              <a:t>22.01.2020</a:t>
+              <a:t>23.01.2020</a:t>
             </a:fld>
             <a:endParaRPr lang="nb-NO"/>
           </a:p>
@@ -780,7 +780,7 @@
           <a:p>
             <a:fld id="{083A9BE8-26B7-4D1D-8CFD-17723E99B246}" type="datetimeFigureOut">
               <a:rPr lang="nb-NO" smtClean="0"/>
-              <a:t>22.01.2020</a:t>
+              <a:t>23.01.2020</a:t>
             </a:fld>
             <a:endParaRPr lang="nb-NO"/>
           </a:p>
@@ -960,7 +960,7 @@
           <a:p>
             <a:fld id="{083A9BE8-26B7-4D1D-8CFD-17723E99B246}" type="datetimeFigureOut">
               <a:rPr lang="nb-NO" smtClean="0"/>
-              <a:t>22.01.2020</a:t>
+              <a:t>23.01.2020</a:t>
             </a:fld>
             <a:endParaRPr lang="nb-NO"/>
           </a:p>
@@ -1130,7 +1130,7 @@
           <a:p>
             <a:fld id="{083A9BE8-26B7-4D1D-8CFD-17723E99B246}" type="datetimeFigureOut">
               <a:rPr lang="nb-NO" smtClean="0"/>
-              <a:t>22.01.2020</a:t>
+              <a:t>23.01.2020</a:t>
             </a:fld>
             <a:endParaRPr lang="nb-NO"/>
           </a:p>
@@ -1376,7 +1376,7 @@
           <a:p>
             <a:fld id="{083A9BE8-26B7-4D1D-8CFD-17723E99B246}" type="datetimeFigureOut">
               <a:rPr lang="nb-NO" smtClean="0"/>
-              <a:t>22.01.2020</a:t>
+              <a:t>23.01.2020</a:t>
             </a:fld>
             <a:endParaRPr lang="nb-NO"/>
           </a:p>
@@ -1608,7 +1608,7 @@
           <a:p>
             <a:fld id="{083A9BE8-26B7-4D1D-8CFD-17723E99B246}" type="datetimeFigureOut">
               <a:rPr lang="nb-NO" smtClean="0"/>
-              <a:t>22.01.2020</a:t>
+              <a:t>23.01.2020</a:t>
             </a:fld>
             <a:endParaRPr lang="nb-NO"/>
           </a:p>
@@ -1975,7 +1975,7 @@
           <a:p>
             <a:fld id="{083A9BE8-26B7-4D1D-8CFD-17723E99B246}" type="datetimeFigureOut">
               <a:rPr lang="nb-NO" smtClean="0"/>
-              <a:t>22.01.2020</a:t>
+              <a:t>23.01.2020</a:t>
             </a:fld>
             <a:endParaRPr lang="nb-NO"/>
           </a:p>
@@ -2093,7 +2093,7 @@
           <a:p>
             <a:fld id="{083A9BE8-26B7-4D1D-8CFD-17723E99B246}" type="datetimeFigureOut">
               <a:rPr lang="nb-NO" smtClean="0"/>
-              <a:t>22.01.2020</a:t>
+              <a:t>23.01.2020</a:t>
             </a:fld>
             <a:endParaRPr lang="nb-NO"/>
           </a:p>
@@ -2188,7 +2188,7 @@
           <a:p>
             <a:fld id="{083A9BE8-26B7-4D1D-8CFD-17723E99B246}" type="datetimeFigureOut">
               <a:rPr lang="nb-NO" smtClean="0"/>
-              <a:t>22.01.2020</a:t>
+              <a:t>23.01.2020</a:t>
             </a:fld>
             <a:endParaRPr lang="nb-NO"/>
           </a:p>
@@ -2465,7 +2465,7 @@
           <a:p>
             <a:fld id="{083A9BE8-26B7-4D1D-8CFD-17723E99B246}" type="datetimeFigureOut">
               <a:rPr lang="nb-NO" smtClean="0"/>
-              <a:t>22.01.2020</a:t>
+              <a:t>23.01.2020</a:t>
             </a:fld>
             <a:endParaRPr lang="nb-NO"/>
           </a:p>
@@ -2718,7 +2718,7 @@
           <a:p>
             <a:fld id="{083A9BE8-26B7-4D1D-8CFD-17723E99B246}" type="datetimeFigureOut">
               <a:rPr lang="nb-NO" smtClean="0"/>
-              <a:t>22.01.2020</a:t>
+              <a:t>23.01.2020</a:t>
             </a:fld>
             <a:endParaRPr lang="nb-NO"/>
           </a:p>
@@ -2931,7 +2931,7 @@
           <a:p>
             <a:fld id="{083A9BE8-26B7-4D1D-8CFD-17723E99B246}" type="datetimeFigureOut">
               <a:rPr lang="nb-NO" smtClean="0"/>
-              <a:t>22.01.2020</a:t>
+              <a:t>23.01.2020</a:t>
             </a:fld>
             <a:endParaRPr lang="nb-NO"/>
           </a:p>
@@ -3586,11 +3586,7 @@
               </a:r>
               <a:r>
                 <a:rPr lang="en-US" sz="1000" dirty="0" err="1" smtClean="0"/>
-                <a:t>ata</a:t>
-              </a:r>
-              <a:r>
-                <a:rPr lang="en-US" sz="1000" dirty="0" err="1" smtClean="0"/>
-                <a:t>klynge</a:t>
+                <a:t>ataklynge</a:t>
               </a:r>
               <a:endParaRPr lang="nb-NO" sz="1000" dirty="0"/>
             </a:p>
@@ -3811,11 +3807,7 @@
                 </a:r>
                 <a:r>
                   <a:rPr lang="en-US" sz="800" dirty="0" err="1" smtClean="0"/>
-                  <a:t>ata</a:t>
-                </a:r>
-                <a:r>
-                  <a:rPr lang="en-US" sz="800" dirty="0" err="1" smtClean="0"/>
-                  <a:t>klynge</a:t>
+                  <a:t>ataklynge</a:t>
                 </a:r>
                 <a:r>
                   <a:rPr lang="en-US" sz="800" dirty="0" smtClean="0"/>
@@ -3848,11 +3840,7 @@
                 </a:r>
                 <a:r>
                   <a:rPr lang="en-US" sz="800" dirty="0" smtClean="0"/>
-                  <a:t>( new </a:t>
-                </a:r>
-                <a:r>
-                  <a:rPr lang="en-US" sz="800" dirty="0" smtClean="0"/>
-                  <a:t>Node(128, </a:t>
+                  <a:t>( new Node(128, </a:t>
                 </a:r>
                 <a:r>
                   <a:rPr lang="en-US" sz="800" dirty="0"/>
@@ -3862,7 +3850,6 @@
                   <a:rPr lang="en-US" sz="800" dirty="0" smtClean="0"/>
                   <a:t>));</a:t>
                 </a:r>
-                <a:endParaRPr lang="en-US" sz="800" dirty="0" smtClean="0"/>
               </a:p>
               <a:p>
                 <a:r>
@@ -3877,7 +3864,6 @@
                   <a:rPr lang="en-US" sz="800" dirty="0" smtClean="0"/>
                   <a:t>Node(128, 2));</a:t>
                 </a:r>
-                <a:endParaRPr lang="en-US" sz="800" dirty="0" smtClean="0"/>
               </a:p>
               <a:p>
                 <a:r>
@@ -3900,7 +3886,6 @@
                   <a:rPr lang="en-US" sz="800" dirty="0" smtClean="0"/>
                   <a:t>));</a:t>
                 </a:r>
-                <a:endParaRPr lang="en-US" sz="800" dirty="0" smtClean="0"/>
               </a:p>
             </p:txBody>
           </p:sp>
@@ -3987,10 +3972,10 @@
         </p:nvGrpSpPr>
         <p:grpSpPr>
           <a:xfrm>
-            <a:off x="4889158" y="1449610"/>
-            <a:ext cx="2545085" cy="426749"/>
-            <a:chOff x="6130719" y="1868789"/>
-            <a:chExt cx="2987881" cy="570940"/>
+            <a:off x="4889158" y="1291787"/>
+            <a:ext cx="2523449" cy="389289"/>
+            <a:chOff x="6130719" y="1918906"/>
+            <a:chExt cx="2962481" cy="520823"/>
           </a:xfrm>
         </p:grpSpPr>
         <p:grpSp>
@@ -4034,18 +4019,6 @@
               </a:bodyPr>
               <a:lstStyle/>
               <a:p>
-                <a:r>
-                  <a:rPr lang="en-US" sz="800" dirty="0"/>
-                  <a:t>r</a:t>
-                </a:r>
-                <a:r>
-                  <a:rPr lang="en-US" sz="800" dirty="0" smtClean="0"/>
-                  <a:t>eturn </a:t>
-                </a:r>
-                <a:r>
-                  <a:rPr lang="en-US" sz="800" dirty="0" err="1" smtClean="0"/>
-                  <a:t>nodeLagtTil</a:t>
-                </a:r>
                 <a:endParaRPr lang="en-US" sz="800" dirty="0" smtClean="0"/>
               </a:p>
             </p:txBody>
@@ -4094,7 +4067,7 @@
           </p:nvSpPr>
           <p:spPr>
             <a:xfrm>
-              <a:off x="6531676" y="1868789"/>
+              <a:off x="6506274" y="1918906"/>
               <a:ext cx="2586924" cy="288239"/>
             </a:xfrm>
             <a:prstGeom prst="rect">
@@ -4113,8 +4086,8 @@
                 <a:t>public </a:t>
               </a:r>
               <a:r>
-                <a:rPr lang="en-US" sz="800" dirty="0" err="1" smtClean="0"/>
-                <a:t>boolean</a:t>
+                <a:rPr lang="en-US" sz="800" dirty="0" smtClean="0"/>
+                <a:t>void</a:t>
               </a:r>
               <a:r>
                 <a:rPr lang="en-US" sz="800" dirty="0" smtClean="0"/>
@@ -4141,10 +4114,10 @@
         </p:nvGrpSpPr>
         <p:grpSpPr>
           <a:xfrm>
-            <a:off x="4889158" y="1967008"/>
-            <a:ext cx="2744590" cy="433625"/>
-            <a:chOff x="7858412" y="3878697"/>
-            <a:chExt cx="3222096" cy="580139"/>
+            <a:off x="4889158" y="2165555"/>
+            <a:ext cx="2729754" cy="387481"/>
+            <a:chOff x="7858412" y="3940431"/>
+            <a:chExt cx="3204679" cy="518403"/>
           </a:xfrm>
         </p:grpSpPr>
         <p:grpSp>
@@ -4156,9 +4129,9 @@
           <p:grpSpPr>
             <a:xfrm>
               <a:off x="7858412" y="4165221"/>
-              <a:ext cx="2962481" cy="293615"/>
+              <a:ext cx="2962481" cy="293613"/>
               <a:chOff x="851807" y="1158997"/>
-              <a:chExt cx="2962481" cy="293615"/>
+              <a:chExt cx="2962481" cy="293613"/>
             </a:xfrm>
           </p:grpSpPr>
           <p:sp>
@@ -4169,8 +4142,8 @@
             </p:nvSpPr>
             <p:spPr>
               <a:xfrm>
-                <a:off x="1227363" y="1164374"/>
-                <a:ext cx="2586925" cy="288238"/>
+                <a:off x="1227363" y="1164371"/>
+                <a:ext cx="2586925" cy="288239"/>
               </a:xfrm>
               <a:prstGeom prst="rect">
                 <a:avLst/>
@@ -4248,8 +4221,8 @@
           </p:nvSpPr>
           <p:spPr>
             <a:xfrm>
-              <a:off x="8233969" y="3878697"/>
-              <a:ext cx="2846539" cy="288238"/>
+              <a:off x="8216551" y="3940431"/>
+              <a:ext cx="2846540" cy="288238"/>
             </a:xfrm>
             <a:prstGeom prst="rect">
               <a:avLst/>
@@ -4279,12 +4252,8 @@
                 <a:t> </a:t>
               </a:r>
               <a:r>
-                <a:rPr lang="en-US" sz="800" dirty="0" err="1" smtClean="0"/>
-                <a:t>prosessorerIRack</a:t>
-              </a:r>
-              <a:r>
-                <a:rPr lang="en-US" sz="800" dirty="0" smtClean="0"/>
-                <a:t>()</a:t>
+                <a:rPr lang="en-US" sz="800" smtClean="0"/>
+                <a:t>ledigPlass()</a:t>
               </a:r>
               <a:endParaRPr lang="en-US" sz="800" dirty="0"/>
             </a:p>
@@ -4299,10 +4268,10 @@
         </p:nvGrpSpPr>
         <p:grpSpPr>
           <a:xfrm>
-            <a:off x="4889158" y="2532880"/>
-            <a:ext cx="2842356" cy="426749"/>
-            <a:chOff x="6156119" y="1868789"/>
-            <a:chExt cx="3336872" cy="570940"/>
+            <a:off x="4889157" y="2616327"/>
+            <a:ext cx="2842354" cy="381402"/>
+            <a:chOff x="6156119" y="1929458"/>
+            <a:chExt cx="3336870" cy="510271"/>
           </a:xfrm>
         </p:grpSpPr>
         <p:grpSp>
@@ -4406,7 +4375,7 @@
           </p:nvSpPr>
           <p:spPr>
             <a:xfrm>
-              <a:off x="6531676" y="1868789"/>
+              <a:off x="6531674" y="1929458"/>
               <a:ext cx="2961315" cy="288239"/>
             </a:xfrm>
             <a:prstGeom prst="rect">
@@ -6623,11 +6592,7 @@
               </a:r>
               <a:r>
                 <a:rPr lang="en-US" sz="800" dirty="0" err="1" smtClean="0"/>
-                <a:t>Data</a:t>
-              </a:r>
-              <a:r>
-                <a:rPr lang="en-US" sz="800" dirty="0" err="1" smtClean="0"/>
-                <a:t>klynge</a:t>
+                <a:t>Dataklynge</a:t>
               </a:r>
               <a:endParaRPr lang="nb-NO" sz="800" dirty="0"/>
             </a:p>
@@ -7682,480 +7647,6 @@
           </a:p>
         </p:txBody>
       </p:sp>
-      <p:grpSp>
-        <p:nvGrpSpPr>
-          <p:cNvPr id="300" name="Gruppe 299"/>
-          <p:cNvGrpSpPr/>
-          <p:nvPr/>
-        </p:nvGrpSpPr>
-        <p:grpSpPr>
-          <a:xfrm>
-            <a:off x="4895905" y="4637535"/>
-            <a:ext cx="2545085" cy="426749"/>
-            <a:chOff x="6130719" y="1868789"/>
-            <a:chExt cx="2987881" cy="570940"/>
-          </a:xfrm>
-        </p:grpSpPr>
-        <p:grpSp>
-          <p:nvGrpSpPr>
-            <p:cNvPr id="301" name="Gruppe 300"/>
-            <p:cNvGrpSpPr/>
-            <p:nvPr/>
-          </p:nvGrpSpPr>
-          <p:grpSpPr>
-            <a:xfrm>
-              <a:off x="6130719" y="2151490"/>
-              <a:ext cx="2962481" cy="288239"/>
-              <a:chOff x="826407" y="1164374"/>
-              <a:chExt cx="2962481" cy="288239"/>
-            </a:xfrm>
-          </p:grpSpPr>
-          <p:sp>
-            <p:nvSpPr>
-              <p:cNvPr id="303" name="TekstSylinder 302"/>
-              <p:cNvSpPr txBox="1"/>
-              <p:nvPr/>
-            </p:nvSpPr>
-            <p:spPr>
-              <a:xfrm>
-                <a:off x="1201963" y="1164374"/>
-                <a:ext cx="2586925" cy="288239"/>
-              </a:xfrm>
-              <a:prstGeom prst="rect">
-                <a:avLst/>
-              </a:prstGeom>
-              <a:noFill/>
-              <a:ln>
-                <a:solidFill>
-                  <a:schemeClr val="accent1"/>
-                </a:solidFill>
-              </a:ln>
-            </p:spPr>
-            <p:txBody>
-              <a:bodyPr wrap="square" rtlCol="0">
-                <a:spAutoFit/>
-              </a:bodyPr>
-              <a:lstStyle/>
-              <a:p>
-                <a:endParaRPr lang="en-US" sz="800" dirty="0" smtClean="0"/>
-              </a:p>
-            </p:txBody>
-          </p:sp>
-          <p:cxnSp>
-            <p:nvCxnSpPr>
-              <p:cNvPr id="304" name="Rett linje 303"/>
-              <p:cNvCxnSpPr/>
-              <p:nvPr/>
-            </p:nvCxnSpPr>
-            <p:spPr>
-              <a:xfrm flipH="1">
-                <a:off x="826407" y="1171741"/>
-                <a:ext cx="457200" cy="0"/>
-              </a:xfrm>
-              <a:prstGeom prst="line">
-                <a:avLst/>
-              </a:prstGeom>
-              <a:ln>
-                <a:solidFill>
-                  <a:schemeClr val="accent1"/>
-                </a:solidFill>
-              </a:ln>
-            </p:spPr>
-            <p:style>
-              <a:lnRef idx="1">
-                <a:schemeClr val="accent1"/>
-              </a:lnRef>
-              <a:fillRef idx="0">
-                <a:schemeClr val="accent1"/>
-              </a:fillRef>
-              <a:effectRef idx="0">
-                <a:schemeClr val="accent1"/>
-              </a:effectRef>
-              <a:fontRef idx="minor">
-                <a:schemeClr val="tx1"/>
-              </a:fontRef>
-            </p:style>
-          </p:cxnSp>
-        </p:grpSp>
-        <p:sp>
-          <p:nvSpPr>
-            <p:cNvPr id="302" name="TekstSylinder 301"/>
-            <p:cNvSpPr txBox="1"/>
-            <p:nvPr/>
-          </p:nvSpPr>
-          <p:spPr>
-            <a:xfrm>
-              <a:off x="6531676" y="1868789"/>
-              <a:ext cx="2586924" cy="288239"/>
-            </a:xfrm>
-            <a:prstGeom prst="rect">
-              <a:avLst/>
-            </a:prstGeom>
-            <a:noFill/>
-          </p:spPr>
-          <p:txBody>
-            <a:bodyPr wrap="square" rtlCol="0">
-              <a:spAutoFit/>
-            </a:bodyPr>
-            <a:lstStyle/>
-            <a:p>
-              <a:r>
-                <a:rPr lang="en-US" sz="800" dirty="0" smtClean="0"/>
-                <a:t>public </a:t>
-              </a:r>
-              <a:r>
-                <a:rPr lang="en-US" sz="800" dirty="0" err="1" smtClean="0"/>
-                <a:t>boolean</a:t>
-              </a:r>
-              <a:r>
-                <a:rPr lang="en-US" sz="800" dirty="0" smtClean="0"/>
-                <a:t> </a:t>
-              </a:r>
-              <a:r>
-                <a:rPr lang="en-US" sz="800" dirty="0" err="1" smtClean="0"/>
-                <a:t>leggTilNode</a:t>
-              </a:r>
-              <a:r>
-                <a:rPr lang="en-US" sz="800" dirty="0" smtClean="0"/>
-                <a:t>(Node node)</a:t>
-              </a:r>
-              <a:endParaRPr lang="en-US" sz="800" dirty="0"/>
-            </a:p>
-          </p:txBody>
-        </p:sp>
-      </p:grpSp>
-      <p:grpSp>
-        <p:nvGrpSpPr>
-          <p:cNvPr id="305" name="Gruppe 304"/>
-          <p:cNvGrpSpPr/>
-          <p:nvPr/>
-        </p:nvGrpSpPr>
-        <p:grpSpPr>
-          <a:xfrm>
-            <a:off x="4895905" y="5154933"/>
-            <a:ext cx="2744590" cy="433625"/>
-            <a:chOff x="7858412" y="3878697"/>
-            <a:chExt cx="3222096" cy="580139"/>
-          </a:xfrm>
-        </p:grpSpPr>
-        <p:grpSp>
-          <p:nvGrpSpPr>
-            <p:cNvPr id="306" name="Gruppe 305"/>
-            <p:cNvGrpSpPr/>
-            <p:nvPr/>
-          </p:nvGrpSpPr>
-          <p:grpSpPr>
-            <a:xfrm>
-              <a:off x="7858412" y="4170598"/>
-              <a:ext cx="2962481" cy="288238"/>
-              <a:chOff x="851807" y="1164374"/>
-              <a:chExt cx="2962481" cy="288238"/>
-            </a:xfrm>
-          </p:grpSpPr>
-          <p:sp>
-            <p:nvSpPr>
-              <p:cNvPr id="308" name="TekstSylinder 307"/>
-              <p:cNvSpPr txBox="1"/>
-              <p:nvPr/>
-            </p:nvSpPr>
-            <p:spPr>
-              <a:xfrm>
-                <a:off x="1227363" y="1164374"/>
-                <a:ext cx="2586925" cy="288238"/>
-              </a:xfrm>
-              <a:prstGeom prst="rect">
-                <a:avLst/>
-              </a:prstGeom>
-              <a:noFill/>
-              <a:ln>
-                <a:solidFill>
-                  <a:schemeClr val="accent1"/>
-                </a:solidFill>
-              </a:ln>
-            </p:spPr>
-            <p:txBody>
-              <a:bodyPr wrap="square" rtlCol="0">
-                <a:spAutoFit/>
-              </a:bodyPr>
-              <a:lstStyle/>
-              <a:p>
-                <a:r>
-                  <a:rPr lang="en-US" sz="800" dirty="0"/>
-                  <a:t>r</a:t>
-                </a:r>
-                <a:r>
-                  <a:rPr lang="en-US" sz="800" dirty="0" smtClean="0"/>
-                  <a:t>eturn </a:t>
-                </a:r>
-                <a:r>
-                  <a:rPr lang="en-US" sz="800" dirty="0" err="1" smtClean="0"/>
-                  <a:t>antallProsessorer</a:t>
-                </a:r>
-                <a:endParaRPr lang="en-US" sz="800" dirty="0" smtClean="0"/>
-              </a:p>
-            </p:txBody>
-          </p:sp>
-          <p:cxnSp>
-            <p:nvCxnSpPr>
-              <p:cNvPr id="309" name="Rett linje 308"/>
-              <p:cNvCxnSpPr/>
-              <p:nvPr/>
-            </p:nvCxnSpPr>
-            <p:spPr>
-              <a:xfrm flipH="1">
-                <a:off x="851807" y="1171741"/>
-                <a:ext cx="457200" cy="0"/>
-              </a:xfrm>
-              <a:prstGeom prst="line">
-                <a:avLst/>
-              </a:prstGeom>
-              <a:ln>
-                <a:solidFill>
-                  <a:schemeClr val="accent1"/>
-                </a:solidFill>
-              </a:ln>
-            </p:spPr>
-            <p:style>
-              <a:lnRef idx="1">
-                <a:schemeClr val="accent1"/>
-              </a:lnRef>
-              <a:fillRef idx="0">
-                <a:schemeClr val="accent1"/>
-              </a:fillRef>
-              <a:effectRef idx="0">
-                <a:schemeClr val="accent1"/>
-              </a:effectRef>
-              <a:fontRef idx="minor">
-                <a:schemeClr val="tx1"/>
-              </a:fontRef>
-            </p:style>
-          </p:cxnSp>
-        </p:grpSp>
-        <p:sp>
-          <p:nvSpPr>
-            <p:cNvPr id="307" name="TekstSylinder 306"/>
-            <p:cNvSpPr txBox="1"/>
-            <p:nvPr/>
-          </p:nvSpPr>
-          <p:spPr>
-            <a:xfrm>
-              <a:off x="8233969" y="3878697"/>
-              <a:ext cx="2846539" cy="288238"/>
-            </a:xfrm>
-            <a:prstGeom prst="rect">
-              <a:avLst/>
-            </a:prstGeom>
-            <a:noFill/>
-          </p:spPr>
-          <p:txBody>
-            <a:bodyPr wrap="square" rtlCol="0">
-              <a:spAutoFit/>
-            </a:bodyPr>
-            <a:lstStyle/>
-            <a:p>
-              <a:r>
-                <a:rPr lang="en-US" sz="800" dirty="0"/>
-                <a:t>p</a:t>
-              </a:r>
-              <a:r>
-                <a:rPr lang="en-US" sz="800" dirty="0" smtClean="0"/>
-                <a:t>ublic </a:t>
-              </a:r>
-              <a:r>
-                <a:rPr lang="en-US" sz="800" dirty="0" err="1" smtClean="0"/>
-                <a:t>int</a:t>
-              </a:r>
-              <a:r>
-                <a:rPr lang="en-US" sz="800" dirty="0" smtClean="0"/>
-                <a:t> </a:t>
-              </a:r>
-              <a:r>
-                <a:rPr lang="en-US" sz="800" dirty="0" err="1" smtClean="0"/>
-                <a:t>prosessorerIRack</a:t>
-              </a:r>
-              <a:r>
-                <a:rPr lang="en-US" sz="800" dirty="0" smtClean="0"/>
-                <a:t>()</a:t>
-              </a:r>
-              <a:endParaRPr lang="en-US" sz="800" dirty="0"/>
-            </a:p>
-          </p:txBody>
-        </p:sp>
-      </p:grpSp>
-      <p:grpSp>
-        <p:nvGrpSpPr>
-          <p:cNvPr id="310" name="Gruppe 309"/>
-          <p:cNvGrpSpPr/>
-          <p:nvPr/>
-        </p:nvGrpSpPr>
-        <p:grpSpPr>
-          <a:xfrm>
-            <a:off x="4895905" y="5720805"/>
-            <a:ext cx="2842356" cy="426749"/>
-            <a:chOff x="6156119" y="1868789"/>
-            <a:chExt cx="3336872" cy="570940"/>
-          </a:xfrm>
-        </p:grpSpPr>
-        <p:grpSp>
-          <p:nvGrpSpPr>
-            <p:cNvPr id="311" name="Gruppe 310"/>
-            <p:cNvGrpSpPr/>
-            <p:nvPr/>
-          </p:nvGrpSpPr>
-          <p:grpSpPr>
-            <a:xfrm>
-              <a:off x="6156119" y="2148619"/>
-              <a:ext cx="2962481" cy="291110"/>
-              <a:chOff x="851807" y="1161503"/>
-              <a:chExt cx="2962481" cy="291110"/>
-            </a:xfrm>
-          </p:grpSpPr>
-          <p:sp>
-            <p:nvSpPr>
-              <p:cNvPr id="313" name="TekstSylinder 312"/>
-              <p:cNvSpPr txBox="1"/>
-              <p:nvPr/>
-            </p:nvSpPr>
-            <p:spPr>
-              <a:xfrm>
-                <a:off x="1227363" y="1164374"/>
-                <a:ext cx="2586925" cy="288239"/>
-              </a:xfrm>
-              <a:prstGeom prst="rect">
-                <a:avLst/>
-              </a:prstGeom>
-              <a:noFill/>
-              <a:ln>
-                <a:solidFill>
-                  <a:schemeClr val="accent1"/>
-                </a:solidFill>
-              </a:ln>
-            </p:spPr>
-            <p:txBody>
-              <a:bodyPr wrap="square" rtlCol="0">
-                <a:spAutoFit/>
-              </a:bodyPr>
-              <a:lstStyle/>
-              <a:p>
-                <a:r>
-                  <a:rPr lang="en-US" sz="800" dirty="0"/>
-                  <a:t>r</a:t>
-                </a:r>
-                <a:r>
-                  <a:rPr lang="en-US" sz="800" dirty="0" smtClean="0"/>
-                  <a:t>eturn </a:t>
-                </a:r>
-                <a:r>
-                  <a:rPr lang="en-US" sz="800" dirty="0" err="1" smtClean="0"/>
-                  <a:t>antallNoder</a:t>
-                </a:r>
-                <a:endParaRPr lang="en-US" sz="800" dirty="0" smtClean="0"/>
-              </a:p>
-            </p:txBody>
-          </p:sp>
-          <p:cxnSp>
-            <p:nvCxnSpPr>
-              <p:cNvPr id="314" name="Rett linje 313"/>
-              <p:cNvCxnSpPr/>
-              <p:nvPr/>
-            </p:nvCxnSpPr>
-            <p:spPr>
-              <a:xfrm flipH="1">
-                <a:off x="851807" y="1161503"/>
-                <a:ext cx="457200" cy="0"/>
-              </a:xfrm>
-              <a:prstGeom prst="line">
-                <a:avLst/>
-              </a:prstGeom>
-              <a:ln>
-                <a:solidFill>
-                  <a:schemeClr val="accent1"/>
-                </a:solidFill>
-              </a:ln>
-            </p:spPr>
-            <p:style>
-              <a:lnRef idx="1">
-                <a:schemeClr val="accent1"/>
-              </a:lnRef>
-              <a:fillRef idx="0">
-                <a:schemeClr val="accent1"/>
-              </a:fillRef>
-              <a:effectRef idx="0">
-                <a:schemeClr val="accent1"/>
-              </a:effectRef>
-              <a:fontRef idx="minor">
-                <a:schemeClr val="tx1"/>
-              </a:fontRef>
-            </p:style>
-          </p:cxnSp>
-        </p:grpSp>
-        <p:sp>
-          <p:nvSpPr>
-            <p:cNvPr id="312" name="TekstSylinder 311"/>
-            <p:cNvSpPr txBox="1"/>
-            <p:nvPr/>
-          </p:nvSpPr>
-          <p:spPr>
-            <a:xfrm>
-              <a:off x="6531676" y="1868789"/>
-              <a:ext cx="2961315" cy="288239"/>
-            </a:xfrm>
-            <a:prstGeom prst="rect">
-              <a:avLst/>
-            </a:prstGeom>
-            <a:noFill/>
-          </p:spPr>
-          <p:txBody>
-            <a:bodyPr wrap="square" rtlCol="0">
-              <a:spAutoFit/>
-            </a:bodyPr>
-            <a:lstStyle/>
-            <a:p>
-              <a:r>
-                <a:rPr lang="en-US" sz="800" dirty="0"/>
-                <a:t>p</a:t>
-              </a:r>
-              <a:r>
-                <a:rPr lang="en-US" sz="800" dirty="0" smtClean="0"/>
-                <a:t>ublic </a:t>
-              </a:r>
-              <a:r>
-                <a:rPr lang="en-US" sz="800" dirty="0" err="1" smtClean="0"/>
-                <a:t>int</a:t>
-              </a:r>
-              <a:r>
-                <a:rPr lang="en-US" sz="800" dirty="0" smtClean="0"/>
-                <a:t> </a:t>
-              </a:r>
-              <a:r>
-                <a:rPr lang="en-US" sz="800" dirty="0" err="1" smtClean="0"/>
-                <a:t>NoderMedNokMinne</a:t>
-              </a:r>
-              <a:r>
-                <a:rPr lang="en-US" sz="800" dirty="0" smtClean="0"/>
-                <a:t>(</a:t>
-              </a:r>
-              <a:r>
-                <a:rPr lang="en-US" sz="800" dirty="0" err="1" smtClean="0"/>
-                <a:t>int</a:t>
-              </a:r>
-              <a:r>
-                <a:rPr lang="en-US" sz="800" dirty="0" smtClean="0"/>
-                <a:t> </a:t>
-              </a:r>
-              <a:r>
-                <a:rPr lang="en-US" sz="800" dirty="0" err="1" smtClean="0"/>
-                <a:t>paakrevdMinne</a:t>
-              </a:r>
-              <a:r>
-                <a:rPr lang="en-US" sz="800" dirty="0" smtClean="0"/>
-                <a:t>)</a:t>
-              </a:r>
-              <a:endParaRPr lang="en-US" sz="800" dirty="0"/>
-            </a:p>
-          </p:txBody>
-        </p:sp>
-      </p:grpSp>
       <p:grpSp>
         <p:nvGrpSpPr>
           <p:cNvPr id="315" name="Gruppe 314"/>
@@ -8634,6 +8125,796 @@
           </a:fontRef>
         </p:style>
       </p:cxnSp>
+      <p:grpSp>
+        <p:nvGrpSpPr>
+          <p:cNvPr id="162" name="Gruppe 161"/>
+          <p:cNvGrpSpPr/>
+          <p:nvPr/>
+        </p:nvGrpSpPr>
+        <p:grpSpPr>
+          <a:xfrm>
+            <a:off x="4896778" y="1721029"/>
+            <a:ext cx="2748332" cy="397662"/>
+            <a:chOff x="7858412" y="3926811"/>
+            <a:chExt cx="3226489" cy="532025"/>
+          </a:xfrm>
+        </p:grpSpPr>
+        <p:grpSp>
+          <p:nvGrpSpPr>
+            <p:cNvPr id="163" name="Gruppe 162"/>
+            <p:cNvGrpSpPr/>
+            <p:nvPr/>
+          </p:nvGrpSpPr>
+          <p:grpSpPr>
+            <a:xfrm>
+              <a:off x="7858412" y="4165221"/>
+              <a:ext cx="2962481" cy="293615"/>
+              <a:chOff x="851807" y="1158997"/>
+              <a:chExt cx="2962481" cy="293615"/>
+            </a:xfrm>
+          </p:grpSpPr>
+          <p:sp>
+            <p:nvSpPr>
+              <p:cNvPr id="165" name="TekstSylinder 164"/>
+              <p:cNvSpPr txBox="1"/>
+              <p:nvPr/>
+            </p:nvSpPr>
+            <p:spPr>
+              <a:xfrm>
+                <a:off x="1227363" y="1164374"/>
+                <a:ext cx="2586925" cy="288238"/>
+              </a:xfrm>
+              <a:prstGeom prst="rect">
+                <a:avLst/>
+              </a:prstGeom>
+              <a:noFill/>
+              <a:ln>
+                <a:solidFill>
+                  <a:schemeClr val="accent1"/>
+                </a:solidFill>
+              </a:ln>
+            </p:spPr>
+            <p:txBody>
+              <a:bodyPr wrap="square" rtlCol="0">
+                <a:spAutoFit/>
+              </a:bodyPr>
+              <a:lstStyle/>
+              <a:p>
+                <a:r>
+                  <a:rPr lang="en-US" sz="800" dirty="0"/>
+                  <a:t>r</a:t>
+                </a:r>
+                <a:r>
+                  <a:rPr lang="en-US" sz="800" dirty="0" smtClean="0"/>
+                  <a:t>eturn </a:t>
+                </a:r>
+                <a:r>
+                  <a:rPr lang="en-US" sz="800" dirty="0" smtClean="0"/>
+                  <a:t>true/false</a:t>
+                </a:r>
+                <a:endParaRPr lang="en-US" sz="800" dirty="0" smtClean="0"/>
+              </a:p>
+            </p:txBody>
+          </p:sp>
+          <p:cxnSp>
+            <p:nvCxnSpPr>
+              <p:cNvPr id="166" name="Rett linje 165"/>
+              <p:cNvCxnSpPr/>
+              <p:nvPr/>
+            </p:nvCxnSpPr>
+            <p:spPr>
+              <a:xfrm flipH="1">
+                <a:off x="851807" y="1158997"/>
+                <a:ext cx="457200" cy="0"/>
+              </a:xfrm>
+              <a:prstGeom prst="line">
+                <a:avLst/>
+              </a:prstGeom>
+              <a:ln>
+                <a:solidFill>
+                  <a:schemeClr val="accent1"/>
+                </a:solidFill>
+              </a:ln>
+            </p:spPr>
+            <p:style>
+              <a:lnRef idx="1">
+                <a:schemeClr val="accent1"/>
+              </a:lnRef>
+              <a:fillRef idx="0">
+                <a:schemeClr val="accent1"/>
+              </a:fillRef>
+              <a:effectRef idx="0">
+                <a:schemeClr val="accent1"/>
+              </a:effectRef>
+              <a:fontRef idx="minor">
+                <a:schemeClr val="tx1"/>
+              </a:fontRef>
+            </p:style>
+          </p:cxnSp>
+        </p:grpSp>
+        <p:sp>
+          <p:nvSpPr>
+            <p:cNvPr id="164" name="TekstSylinder 163"/>
+            <p:cNvSpPr txBox="1"/>
+            <p:nvPr/>
+          </p:nvSpPr>
+          <p:spPr>
+            <a:xfrm>
+              <a:off x="8238361" y="3926811"/>
+              <a:ext cx="2846540" cy="288239"/>
+            </a:xfrm>
+            <a:prstGeom prst="rect">
+              <a:avLst/>
+            </a:prstGeom>
+            <a:noFill/>
+          </p:spPr>
+          <p:txBody>
+            <a:bodyPr wrap="square" rtlCol="0">
+              <a:spAutoFit/>
+            </a:bodyPr>
+            <a:lstStyle/>
+            <a:p>
+              <a:r>
+                <a:rPr lang="en-US" sz="800" dirty="0"/>
+                <a:t>p</a:t>
+              </a:r>
+              <a:r>
+                <a:rPr lang="en-US" sz="800" dirty="0" smtClean="0"/>
+                <a:t>ublic </a:t>
+              </a:r>
+              <a:r>
+                <a:rPr lang="en-US" sz="800" dirty="0" err="1" smtClean="0"/>
+                <a:t>boolean</a:t>
+              </a:r>
+              <a:r>
+                <a:rPr lang="en-US" sz="800" dirty="0" smtClean="0"/>
+                <a:t> </a:t>
+              </a:r>
+              <a:r>
+                <a:rPr lang="en-US" sz="800" dirty="0" err="1" smtClean="0"/>
+                <a:t>prosessorerIRack</a:t>
+              </a:r>
+              <a:r>
+                <a:rPr lang="en-US" sz="800" dirty="0" smtClean="0"/>
+                <a:t>()</a:t>
+              </a:r>
+              <a:endParaRPr lang="en-US" sz="800" dirty="0"/>
+            </a:p>
+          </p:txBody>
+        </p:sp>
+      </p:grpSp>
+      <p:grpSp>
+        <p:nvGrpSpPr>
+          <p:cNvPr id="167" name="Gruppe 166"/>
+          <p:cNvGrpSpPr/>
+          <p:nvPr/>
+        </p:nvGrpSpPr>
+        <p:grpSpPr>
+          <a:xfrm>
+            <a:off x="4896778" y="4476947"/>
+            <a:ext cx="2523449" cy="389289"/>
+            <a:chOff x="6130719" y="1918906"/>
+            <a:chExt cx="2962481" cy="520823"/>
+          </a:xfrm>
+        </p:grpSpPr>
+        <p:grpSp>
+          <p:nvGrpSpPr>
+            <p:cNvPr id="168" name="Gruppe 167"/>
+            <p:cNvGrpSpPr/>
+            <p:nvPr/>
+          </p:nvGrpSpPr>
+          <p:grpSpPr>
+            <a:xfrm>
+              <a:off x="6130719" y="2146113"/>
+              <a:ext cx="2962481" cy="293616"/>
+              <a:chOff x="826407" y="1158997"/>
+              <a:chExt cx="2962481" cy="293616"/>
+            </a:xfrm>
+          </p:grpSpPr>
+          <p:sp>
+            <p:nvSpPr>
+              <p:cNvPr id="170" name="TekstSylinder 169"/>
+              <p:cNvSpPr txBox="1"/>
+              <p:nvPr/>
+            </p:nvSpPr>
+            <p:spPr>
+              <a:xfrm>
+                <a:off x="1201963" y="1164374"/>
+                <a:ext cx="2586925" cy="288239"/>
+              </a:xfrm>
+              <a:prstGeom prst="rect">
+                <a:avLst/>
+              </a:prstGeom>
+              <a:noFill/>
+              <a:ln>
+                <a:solidFill>
+                  <a:schemeClr val="accent1"/>
+                </a:solidFill>
+              </a:ln>
+            </p:spPr>
+            <p:txBody>
+              <a:bodyPr wrap="square" rtlCol="0">
+                <a:spAutoFit/>
+              </a:bodyPr>
+              <a:lstStyle/>
+              <a:p>
+                <a:endParaRPr lang="en-US" sz="800" dirty="0" smtClean="0"/>
+              </a:p>
+            </p:txBody>
+          </p:sp>
+          <p:cxnSp>
+            <p:nvCxnSpPr>
+              <p:cNvPr id="171" name="Rett linje 170"/>
+              <p:cNvCxnSpPr/>
+              <p:nvPr/>
+            </p:nvCxnSpPr>
+            <p:spPr>
+              <a:xfrm flipH="1">
+                <a:off x="826407" y="1158997"/>
+                <a:ext cx="457200" cy="0"/>
+              </a:xfrm>
+              <a:prstGeom prst="line">
+                <a:avLst/>
+              </a:prstGeom>
+              <a:ln>
+                <a:solidFill>
+                  <a:schemeClr val="accent1"/>
+                </a:solidFill>
+              </a:ln>
+            </p:spPr>
+            <p:style>
+              <a:lnRef idx="1">
+                <a:schemeClr val="accent1"/>
+              </a:lnRef>
+              <a:fillRef idx="0">
+                <a:schemeClr val="accent1"/>
+              </a:fillRef>
+              <a:effectRef idx="0">
+                <a:schemeClr val="accent1"/>
+              </a:effectRef>
+              <a:fontRef idx="minor">
+                <a:schemeClr val="tx1"/>
+              </a:fontRef>
+            </p:style>
+          </p:cxnSp>
+        </p:grpSp>
+        <p:sp>
+          <p:nvSpPr>
+            <p:cNvPr id="169" name="TekstSylinder 168"/>
+            <p:cNvSpPr txBox="1"/>
+            <p:nvPr/>
+          </p:nvSpPr>
+          <p:spPr>
+            <a:xfrm>
+              <a:off x="6506274" y="1918906"/>
+              <a:ext cx="2586924" cy="288239"/>
+            </a:xfrm>
+            <a:prstGeom prst="rect">
+              <a:avLst/>
+            </a:prstGeom>
+            <a:noFill/>
+          </p:spPr>
+          <p:txBody>
+            <a:bodyPr wrap="square" rtlCol="0">
+              <a:spAutoFit/>
+            </a:bodyPr>
+            <a:lstStyle/>
+            <a:p>
+              <a:r>
+                <a:rPr lang="en-US" sz="800" dirty="0" smtClean="0"/>
+                <a:t>public </a:t>
+              </a:r>
+              <a:r>
+                <a:rPr lang="en-US" sz="800" dirty="0" smtClean="0"/>
+                <a:t>void</a:t>
+              </a:r>
+              <a:r>
+                <a:rPr lang="en-US" sz="800" dirty="0" smtClean="0"/>
+                <a:t> </a:t>
+              </a:r>
+              <a:r>
+                <a:rPr lang="en-US" sz="800" dirty="0" err="1" smtClean="0"/>
+                <a:t>leggTilNode</a:t>
+              </a:r>
+              <a:r>
+                <a:rPr lang="en-US" sz="800" dirty="0" smtClean="0"/>
+                <a:t>(Node node)</a:t>
+              </a:r>
+              <a:endParaRPr lang="en-US" sz="800" dirty="0"/>
+            </a:p>
+          </p:txBody>
+        </p:sp>
+      </p:grpSp>
+      <p:grpSp>
+        <p:nvGrpSpPr>
+          <p:cNvPr id="172" name="Gruppe 171"/>
+          <p:cNvGrpSpPr/>
+          <p:nvPr/>
+        </p:nvGrpSpPr>
+        <p:grpSpPr>
+          <a:xfrm>
+            <a:off x="4896778" y="5350715"/>
+            <a:ext cx="2729754" cy="387481"/>
+            <a:chOff x="7858412" y="3940431"/>
+            <a:chExt cx="3204679" cy="518403"/>
+          </a:xfrm>
+        </p:grpSpPr>
+        <p:grpSp>
+          <p:nvGrpSpPr>
+            <p:cNvPr id="173" name="Gruppe 172"/>
+            <p:cNvGrpSpPr/>
+            <p:nvPr/>
+          </p:nvGrpSpPr>
+          <p:grpSpPr>
+            <a:xfrm>
+              <a:off x="7858412" y="4165221"/>
+              <a:ext cx="2962481" cy="293613"/>
+              <a:chOff x="851807" y="1158997"/>
+              <a:chExt cx="2962481" cy="293613"/>
+            </a:xfrm>
+          </p:grpSpPr>
+          <p:sp>
+            <p:nvSpPr>
+              <p:cNvPr id="175" name="TekstSylinder 174"/>
+              <p:cNvSpPr txBox="1"/>
+              <p:nvPr/>
+            </p:nvSpPr>
+            <p:spPr>
+              <a:xfrm>
+                <a:off x="1227363" y="1164371"/>
+                <a:ext cx="2586925" cy="288239"/>
+              </a:xfrm>
+              <a:prstGeom prst="rect">
+                <a:avLst/>
+              </a:prstGeom>
+              <a:noFill/>
+              <a:ln>
+                <a:solidFill>
+                  <a:schemeClr val="accent1"/>
+                </a:solidFill>
+              </a:ln>
+            </p:spPr>
+            <p:txBody>
+              <a:bodyPr wrap="square" rtlCol="0">
+                <a:spAutoFit/>
+              </a:bodyPr>
+              <a:lstStyle/>
+              <a:p>
+                <a:r>
+                  <a:rPr lang="en-US" sz="800" dirty="0"/>
+                  <a:t>r</a:t>
+                </a:r>
+                <a:r>
+                  <a:rPr lang="en-US" sz="800" dirty="0" smtClean="0"/>
+                  <a:t>eturn </a:t>
+                </a:r>
+                <a:r>
+                  <a:rPr lang="en-US" sz="800" dirty="0" err="1" smtClean="0"/>
+                  <a:t>antallProsessorer</a:t>
+                </a:r>
+                <a:endParaRPr lang="en-US" sz="800" dirty="0" smtClean="0"/>
+              </a:p>
+            </p:txBody>
+          </p:sp>
+          <p:cxnSp>
+            <p:nvCxnSpPr>
+              <p:cNvPr id="176" name="Rett linje 175"/>
+              <p:cNvCxnSpPr/>
+              <p:nvPr/>
+            </p:nvCxnSpPr>
+            <p:spPr>
+              <a:xfrm flipH="1">
+                <a:off x="851807" y="1158997"/>
+                <a:ext cx="457200" cy="0"/>
+              </a:xfrm>
+              <a:prstGeom prst="line">
+                <a:avLst/>
+              </a:prstGeom>
+              <a:ln>
+                <a:solidFill>
+                  <a:schemeClr val="accent1"/>
+                </a:solidFill>
+              </a:ln>
+            </p:spPr>
+            <p:style>
+              <a:lnRef idx="1">
+                <a:schemeClr val="accent1"/>
+              </a:lnRef>
+              <a:fillRef idx="0">
+                <a:schemeClr val="accent1"/>
+              </a:fillRef>
+              <a:effectRef idx="0">
+                <a:schemeClr val="accent1"/>
+              </a:effectRef>
+              <a:fontRef idx="minor">
+                <a:schemeClr val="tx1"/>
+              </a:fontRef>
+            </p:style>
+          </p:cxnSp>
+        </p:grpSp>
+        <p:sp>
+          <p:nvSpPr>
+            <p:cNvPr id="174" name="TekstSylinder 173"/>
+            <p:cNvSpPr txBox="1"/>
+            <p:nvPr/>
+          </p:nvSpPr>
+          <p:spPr>
+            <a:xfrm>
+              <a:off x="8216551" y="3940431"/>
+              <a:ext cx="2846540" cy="288238"/>
+            </a:xfrm>
+            <a:prstGeom prst="rect">
+              <a:avLst/>
+            </a:prstGeom>
+            <a:noFill/>
+          </p:spPr>
+          <p:txBody>
+            <a:bodyPr wrap="square" rtlCol="0">
+              <a:spAutoFit/>
+            </a:bodyPr>
+            <a:lstStyle/>
+            <a:p>
+              <a:r>
+                <a:rPr lang="en-US" sz="800" dirty="0"/>
+                <a:t>p</a:t>
+              </a:r>
+              <a:r>
+                <a:rPr lang="en-US" sz="800" dirty="0" smtClean="0"/>
+                <a:t>ublic </a:t>
+              </a:r>
+              <a:r>
+                <a:rPr lang="en-US" sz="800" dirty="0" err="1" smtClean="0"/>
+                <a:t>int</a:t>
+              </a:r>
+              <a:r>
+                <a:rPr lang="en-US" sz="800" dirty="0" smtClean="0"/>
+                <a:t> </a:t>
+              </a:r>
+              <a:r>
+                <a:rPr lang="en-US" sz="800" dirty="0" err="1" smtClean="0"/>
+                <a:t>prosessorerIRack</a:t>
+              </a:r>
+              <a:r>
+                <a:rPr lang="en-US" sz="800" dirty="0" smtClean="0"/>
+                <a:t>()</a:t>
+              </a:r>
+              <a:endParaRPr lang="en-US" sz="800" dirty="0"/>
+            </a:p>
+          </p:txBody>
+        </p:sp>
+      </p:grpSp>
+      <p:grpSp>
+        <p:nvGrpSpPr>
+          <p:cNvPr id="177" name="Gruppe 176"/>
+          <p:cNvGrpSpPr/>
+          <p:nvPr/>
+        </p:nvGrpSpPr>
+        <p:grpSpPr>
+          <a:xfrm>
+            <a:off x="4896777" y="5801487"/>
+            <a:ext cx="2842354" cy="381402"/>
+            <a:chOff x="6156119" y="1929458"/>
+            <a:chExt cx="3336870" cy="510271"/>
+          </a:xfrm>
+        </p:grpSpPr>
+        <p:grpSp>
+          <p:nvGrpSpPr>
+            <p:cNvPr id="178" name="Gruppe 177"/>
+            <p:cNvGrpSpPr/>
+            <p:nvPr/>
+          </p:nvGrpSpPr>
+          <p:grpSpPr>
+            <a:xfrm>
+              <a:off x="6156119" y="2148619"/>
+              <a:ext cx="2962481" cy="291110"/>
+              <a:chOff x="851807" y="1161503"/>
+              <a:chExt cx="2962481" cy="291110"/>
+            </a:xfrm>
+          </p:grpSpPr>
+          <p:sp>
+            <p:nvSpPr>
+              <p:cNvPr id="180" name="TekstSylinder 179"/>
+              <p:cNvSpPr txBox="1"/>
+              <p:nvPr/>
+            </p:nvSpPr>
+            <p:spPr>
+              <a:xfrm>
+                <a:off x="1227363" y="1164374"/>
+                <a:ext cx="2586925" cy="288239"/>
+              </a:xfrm>
+              <a:prstGeom prst="rect">
+                <a:avLst/>
+              </a:prstGeom>
+              <a:noFill/>
+              <a:ln>
+                <a:solidFill>
+                  <a:schemeClr val="accent1"/>
+                </a:solidFill>
+              </a:ln>
+            </p:spPr>
+            <p:txBody>
+              <a:bodyPr wrap="square" rtlCol="0">
+                <a:spAutoFit/>
+              </a:bodyPr>
+              <a:lstStyle/>
+              <a:p>
+                <a:r>
+                  <a:rPr lang="en-US" sz="800" dirty="0"/>
+                  <a:t>r</a:t>
+                </a:r>
+                <a:r>
+                  <a:rPr lang="en-US" sz="800" dirty="0" smtClean="0"/>
+                  <a:t>eturn </a:t>
+                </a:r>
+                <a:r>
+                  <a:rPr lang="en-US" sz="800" dirty="0" err="1" smtClean="0"/>
+                  <a:t>antallNoder</a:t>
+                </a:r>
+                <a:endParaRPr lang="en-US" sz="800" dirty="0" smtClean="0"/>
+              </a:p>
+            </p:txBody>
+          </p:sp>
+          <p:cxnSp>
+            <p:nvCxnSpPr>
+              <p:cNvPr id="181" name="Rett linje 180"/>
+              <p:cNvCxnSpPr/>
+              <p:nvPr/>
+            </p:nvCxnSpPr>
+            <p:spPr>
+              <a:xfrm flipH="1">
+                <a:off x="851807" y="1161503"/>
+                <a:ext cx="457200" cy="0"/>
+              </a:xfrm>
+              <a:prstGeom prst="line">
+                <a:avLst/>
+              </a:prstGeom>
+              <a:ln>
+                <a:solidFill>
+                  <a:schemeClr val="accent1"/>
+                </a:solidFill>
+              </a:ln>
+            </p:spPr>
+            <p:style>
+              <a:lnRef idx="1">
+                <a:schemeClr val="accent1"/>
+              </a:lnRef>
+              <a:fillRef idx="0">
+                <a:schemeClr val="accent1"/>
+              </a:fillRef>
+              <a:effectRef idx="0">
+                <a:schemeClr val="accent1"/>
+              </a:effectRef>
+              <a:fontRef idx="minor">
+                <a:schemeClr val="tx1"/>
+              </a:fontRef>
+            </p:style>
+          </p:cxnSp>
+        </p:grpSp>
+        <p:sp>
+          <p:nvSpPr>
+            <p:cNvPr id="179" name="TekstSylinder 178"/>
+            <p:cNvSpPr txBox="1"/>
+            <p:nvPr/>
+          </p:nvSpPr>
+          <p:spPr>
+            <a:xfrm>
+              <a:off x="6531674" y="1929458"/>
+              <a:ext cx="2961315" cy="288239"/>
+            </a:xfrm>
+            <a:prstGeom prst="rect">
+              <a:avLst/>
+            </a:prstGeom>
+            <a:noFill/>
+          </p:spPr>
+          <p:txBody>
+            <a:bodyPr wrap="square" rtlCol="0">
+              <a:spAutoFit/>
+            </a:bodyPr>
+            <a:lstStyle/>
+            <a:p>
+              <a:r>
+                <a:rPr lang="en-US" sz="800" dirty="0"/>
+                <a:t>p</a:t>
+              </a:r>
+              <a:r>
+                <a:rPr lang="en-US" sz="800" dirty="0" smtClean="0"/>
+                <a:t>ublic </a:t>
+              </a:r>
+              <a:r>
+                <a:rPr lang="en-US" sz="800" dirty="0" err="1" smtClean="0"/>
+                <a:t>int</a:t>
+              </a:r>
+              <a:r>
+                <a:rPr lang="en-US" sz="800" dirty="0" smtClean="0"/>
+                <a:t> </a:t>
+              </a:r>
+              <a:r>
+                <a:rPr lang="en-US" sz="800" dirty="0" err="1" smtClean="0"/>
+                <a:t>NoderMedNokMinne</a:t>
+              </a:r>
+              <a:r>
+                <a:rPr lang="en-US" sz="800" dirty="0" smtClean="0"/>
+                <a:t>(</a:t>
+              </a:r>
+              <a:r>
+                <a:rPr lang="en-US" sz="800" dirty="0" err="1" smtClean="0"/>
+                <a:t>int</a:t>
+              </a:r>
+              <a:r>
+                <a:rPr lang="en-US" sz="800" dirty="0" smtClean="0"/>
+                <a:t> </a:t>
+              </a:r>
+              <a:r>
+                <a:rPr lang="en-US" sz="800" dirty="0" err="1" smtClean="0"/>
+                <a:t>paakrevdMinne</a:t>
+              </a:r>
+              <a:r>
+                <a:rPr lang="en-US" sz="800" dirty="0" smtClean="0"/>
+                <a:t>)</a:t>
+              </a:r>
+              <a:endParaRPr lang="en-US" sz="800" dirty="0"/>
+            </a:p>
+          </p:txBody>
+        </p:sp>
+      </p:grpSp>
+      <p:grpSp>
+        <p:nvGrpSpPr>
+          <p:cNvPr id="182" name="Gruppe 181"/>
+          <p:cNvGrpSpPr/>
+          <p:nvPr/>
+        </p:nvGrpSpPr>
+        <p:grpSpPr>
+          <a:xfrm>
+            <a:off x="4904398" y="4906189"/>
+            <a:ext cx="2748332" cy="397662"/>
+            <a:chOff x="7858412" y="3926811"/>
+            <a:chExt cx="3226489" cy="532025"/>
+          </a:xfrm>
+        </p:grpSpPr>
+        <p:grpSp>
+          <p:nvGrpSpPr>
+            <p:cNvPr id="202" name="Gruppe 201"/>
+            <p:cNvGrpSpPr/>
+            <p:nvPr/>
+          </p:nvGrpSpPr>
+          <p:grpSpPr>
+            <a:xfrm>
+              <a:off x="7858412" y="4165221"/>
+              <a:ext cx="2962481" cy="293615"/>
+              <a:chOff x="851807" y="1158997"/>
+              <a:chExt cx="2962481" cy="293615"/>
+            </a:xfrm>
+          </p:grpSpPr>
+          <p:sp>
+            <p:nvSpPr>
+              <p:cNvPr id="204" name="TekstSylinder 203"/>
+              <p:cNvSpPr txBox="1"/>
+              <p:nvPr/>
+            </p:nvSpPr>
+            <p:spPr>
+              <a:xfrm>
+                <a:off x="1227363" y="1164374"/>
+                <a:ext cx="2586925" cy="288238"/>
+              </a:xfrm>
+              <a:prstGeom prst="rect">
+                <a:avLst/>
+              </a:prstGeom>
+              <a:noFill/>
+              <a:ln>
+                <a:solidFill>
+                  <a:schemeClr val="accent1"/>
+                </a:solidFill>
+              </a:ln>
+            </p:spPr>
+            <p:txBody>
+              <a:bodyPr wrap="square" rtlCol="0">
+                <a:spAutoFit/>
+              </a:bodyPr>
+              <a:lstStyle/>
+              <a:p>
+                <a:r>
+                  <a:rPr lang="en-US" sz="800" dirty="0"/>
+                  <a:t>r</a:t>
+                </a:r>
+                <a:r>
+                  <a:rPr lang="en-US" sz="800" dirty="0" smtClean="0"/>
+                  <a:t>eturn </a:t>
+                </a:r>
+                <a:r>
+                  <a:rPr lang="en-US" sz="800" dirty="0" smtClean="0"/>
+                  <a:t>true/false</a:t>
+                </a:r>
+                <a:endParaRPr lang="en-US" sz="800" dirty="0" smtClean="0"/>
+              </a:p>
+            </p:txBody>
+          </p:sp>
+          <p:cxnSp>
+            <p:nvCxnSpPr>
+              <p:cNvPr id="205" name="Rett linje 204"/>
+              <p:cNvCxnSpPr/>
+              <p:nvPr/>
+            </p:nvCxnSpPr>
+            <p:spPr>
+              <a:xfrm flipH="1">
+                <a:off x="851807" y="1158997"/>
+                <a:ext cx="457200" cy="0"/>
+              </a:xfrm>
+              <a:prstGeom prst="line">
+                <a:avLst/>
+              </a:prstGeom>
+              <a:ln>
+                <a:solidFill>
+                  <a:schemeClr val="accent1"/>
+                </a:solidFill>
+              </a:ln>
+            </p:spPr>
+            <p:style>
+              <a:lnRef idx="1">
+                <a:schemeClr val="accent1"/>
+              </a:lnRef>
+              <a:fillRef idx="0">
+                <a:schemeClr val="accent1"/>
+              </a:fillRef>
+              <a:effectRef idx="0">
+                <a:schemeClr val="accent1"/>
+              </a:effectRef>
+              <a:fontRef idx="minor">
+                <a:schemeClr val="tx1"/>
+              </a:fontRef>
+            </p:style>
+          </p:cxnSp>
+        </p:grpSp>
+        <p:sp>
+          <p:nvSpPr>
+            <p:cNvPr id="203" name="TekstSylinder 202"/>
+            <p:cNvSpPr txBox="1"/>
+            <p:nvPr/>
+          </p:nvSpPr>
+          <p:spPr>
+            <a:xfrm>
+              <a:off x="8238361" y="3926811"/>
+              <a:ext cx="2846540" cy="288239"/>
+            </a:xfrm>
+            <a:prstGeom prst="rect">
+              <a:avLst/>
+            </a:prstGeom>
+            <a:noFill/>
+          </p:spPr>
+          <p:txBody>
+            <a:bodyPr wrap="square" rtlCol="0">
+              <a:spAutoFit/>
+            </a:bodyPr>
+            <a:lstStyle/>
+            <a:p>
+              <a:r>
+                <a:rPr lang="en-US" sz="800" dirty="0"/>
+                <a:t>p</a:t>
+              </a:r>
+              <a:r>
+                <a:rPr lang="en-US" sz="800" dirty="0" smtClean="0"/>
+                <a:t>ublic </a:t>
+              </a:r>
+              <a:r>
+                <a:rPr lang="en-US" sz="800" dirty="0" err="1" smtClean="0"/>
+                <a:t>boolean</a:t>
+              </a:r>
+              <a:r>
+                <a:rPr lang="en-US" sz="800" dirty="0" smtClean="0"/>
+                <a:t> </a:t>
+              </a:r>
+              <a:r>
+                <a:rPr lang="en-US" sz="800" dirty="0" err="1" smtClean="0"/>
+                <a:t>ledigPlass</a:t>
+              </a:r>
+              <a:r>
+                <a:rPr lang="en-US" sz="800" dirty="0" smtClean="0"/>
+                <a:t>()</a:t>
+              </a:r>
+              <a:endParaRPr lang="en-US" sz="800" dirty="0"/>
+            </a:p>
+          </p:txBody>
+        </p:sp>
+      </p:grpSp>
     </p:spTree>
     <p:extLst>
       <p:ext uri="{BB962C8B-B14F-4D97-AF65-F5344CB8AC3E}">

</xml_diff>